<commit_message>
feat:(docs) update zh-cn/curator-internal-implementation-mechanism.md article
</commit_message>
<xml_diff>
--- a/docs/assets/images/curator-internal-implementation-mechanism/Curator internal implementation mechanism-Anigkus.pptx
+++ b/docs/assets/images/curator-internal-implementation-mechanism/Curator internal implementation mechanism-Anigkus.pptx
@@ -7632,7 +7632,7 @@
         <p:spPr>
           <a:xfrm>
             <a:off x="518795" y="1352550"/>
-            <a:ext cx="18997295" cy="1156970"/>
+            <a:ext cx="18997295" cy="801370"/>
           </a:xfrm>
           <a:prstGeom prst="rect">
             <a:avLst/>
@@ -7655,22 +7655,7 @@
                   <a:schemeClr val="bg1"/>
                 </a:solidFill>
               </a:rPr>
-              <a:t>All operations of Curator, including setData create delete and so on. If it fails, retry is allowed.</a:t>
-            </a:r>
-            <a:endParaRPr sz="2100" b="1" dirty="0" smtClean="0">
-              <a:solidFill>
-                <a:schemeClr val="bg1"/>
-              </a:solidFill>
-            </a:endParaRPr>
-          </a:p>
-          <a:p>
-            <a:r>
-              <a:rPr sz="2100" b="1" dirty="0" smtClean="0">
-                <a:solidFill>
-                  <a:schemeClr val="bg1"/>
-                </a:solidFill>
-              </a:rPr>
-              <a:t>There are several retry strategies built into the system. Developers can implement the RetryPolicy interface and customize their own policies as needed</a:t>
+              <a:t>All operations of Curator, including setData create delete, etc. If it fails, it is allowed to retry several retry strategies within the system. Developers can customize their own strategies by implementing the RetryPolicy interface as needed.</a:t>
             </a:r>
             <a:endParaRPr sz="2100" b="1" dirty="0" smtClean="0">
               <a:solidFill>
@@ -7707,7 +7692,7 @@
                   <a:schemeClr val="bg1"/>
                 </a:solidFill>
               </a:rPr>
-              <a:t>Default retry strategy:</a:t>
+              <a:t>Default retry policy:</a:t>
             </a:r>
             <a:endParaRPr lang="zh-CN" altLang="en-US" sz="2100" dirty="0" smtClean="0">
               <a:solidFill>
@@ -7729,7 +7714,7 @@
                   <a:schemeClr val="bg1"/>
                 </a:solidFill>
               </a:rPr>
-              <a:t>1. RetryNTimes(int n, int sleepMsBetweenRetries)</a:t>
+              <a:t>* RetryNTimes(int n, int sleepMsBetweenRetries)</a:t>
             </a:r>
             <a:endParaRPr lang="zh-CN" altLang="en-US" sz="2100" dirty="0" smtClean="0">
               <a:solidFill>
@@ -7744,7 +7729,7 @@
                   <a:schemeClr val="bg1"/>
                 </a:solidFill>
               </a:rPr>
-              <a:t>n: The maximum number of retries.</a:t>
+              <a:t>n: maximum number of retries.</a:t>
             </a:r>
             <a:endParaRPr lang="zh-CN" altLang="en-US" sz="2100" dirty="0" smtClean="0">
               <a:solidFill>
@@ -7759,7 +7744,7 @@
                   <a:schemeClr val="bg1"/>
                 </a:solidFill>
               </a:rPr>
-              <a:t>sleepMsBetweenRetry: Time between retry.</a:t>
+              <a:t>sleepMsBetweenRetry: time between retry.</a:t>
             </a:r>
             <a:endParaRPr lang="zh-CN" altLang="en-US" sz="2100" dirty="0" smtClean="0">
               <a:solidFill>
@@ -7781,7 +7766,7 @@
                   <a:schemeClr val="bg1"/>
                 </a:solidFill>
               </a:rPr>
-              <a:t>2. RetryOneTime(int sleepMsBetweenRetry)</a:t>
+              <a:t>* RetryOneTime(int sleepMsBetweenRetry)</a:t>
             </a:r>
             <a:endParaRPr lang="zh-CN" altLang="en-US" sz="2100" dirty="0" smtClean="0">
               <a:solidFill>
@@ -7818,7 +7803,7 @@
                   <a:schemeClr val="bg1"/>
                 </a:solidFill>
               </a:rPr>
-              <a:t>3.RetryUntilElapsed(int maxElapsedTimeMs, int sleepMsBetweenRetries)</a:t>
+              <a:t>* RetryUntilElapsed(int maxElapsedTimeMs, int sleepMsBetweenRetries)</a:t>
             </a:r>
             <a:endParaRPr lang="zh-CN" altLang="en-US" sz="2100" dirty="0" smtClean="0">
               <a:solidFill>
@@ -7833,7 +7818,7 @@
                   <a:schemeClr val="bg1"/>
                 </a:solidFill>
               </a:rPr>
-              <a:t>          After the retry time exceeds the maximum time, no more retries.</a:t>
+              <a:t>After the retry time exceeds the maximum time, no more retries.</a:t>
             </a:r>
             <a:endParaRPr lang="zh-CN" altLang="en-US" sz="2100" dirty="0" smtClean="0">
               <a:solidFill>
@@ -7885,7 +7870,7 @@
                   <a:schemeClr val="bg1"/>
                 </a:solidFill>
               </a:rPr>
-              <a:t>4. ExponentialBackoffRetry(int baseSleepTimeMs, int maxRetries, int maxSleepMs)</a:t>
+              <a:t>* ExponentialBackoffRetry(int baseSleepTimeMs, int maxRetries, int maxSleepMs)</a:t>
             </a:r>
             <a:endParaRPr lang="zh-CN" altLang="en-US" sz="2100" dirty="0" smtClean="0">
               <a:solidFill>
@@ -7915,7 +7900,7 @@
                   <a:schemeClr val="bg1"/>
                 </a:solidFill>
               </a:rPr>
-              <a:t>maxRetries: The maximum number of retries.</a:t>
+              <a:t>maxRetries: Maximum number of retries.</a:t>
             </a:r>
             <a:endParaRPr lang="zh-CN" altLang="en-US" sz="2100" dirty="0" smtClean="0">
               <a:solidFill>
@@ -7952,7 +7937,7 @@
                   <a:schemeClr val="bg1"/>
                 </a:solidFill>
               </a:rPr>
-              <a:t>The current time to sleep: baseSleepTimeMs*Math.max(1,random.nextInt(1&lt;&lt;retryCount+1)), increase the number of retries with the number of retries</a:t>
+              <a:t>The current sleep time: baseSleepTimeMs*Math.max(1, random.nextInt(1 &lt;&lt; retryCount+1)), with the number of retries, increase the number of retries</a:t>
             </a:r>
             <a:endParaRPr lang="zh-CN" altLang="en-US" sz="2100" dirty="0" smtClean="0">
               <a:solidFill>
@@ -7967,7 +7952,7 @@
                   <a:schemeClr val="bg1"/>
                 </a:solidFill>
               </a:rPr>
-              <a:t>time interval, exponentially increasing.</a:t>
+              <a:t>The time interval increases exponentially.</a:t>
             </a:r>
             <a:endParaRPr lang="zh-CN" altLang="en-US" sz="2100" dirty="0" smtClean="0">
               <a:solidFill>
@@ -43839,33 +43824,9 @@
           </p:txBody>
         </p:sp>
       </p:grpSp>
-      <p:pic>
-        <p:nvPicPr>
-          <p:cNvPr id="3" name="Picture 2"/>
-          <p:cNvPicPr>
-            <a:picLocks noChangeAspect="1"/>
-          </p:cNvPicPr>
-          <p:nvPr/>
-        </p:nvPicPr>
-        <p:blipFill>
-          <a:blip r:embed="rId1"/>
-          <a:stretch>
-            <a:fillRect/>
-          </a:stretch>
-        </p:blipFill>
-        <p:spPr>
-          <a:xfrm>
-            <a:off x="846455" y="3038475"/>
-            <a:ext cx="6184900" cy="6184900"/>
-          </a:xfrm>
-          <a:prstGeom prst="rect">
-            <a:avLst/>
-          </a:prstGeom>
-        </p:spPr>
-      </p:pic>
       <p:sp>
         <p:nvSpPr>
-          <p:cNvPr id="12" name="文本框 3"/>
+          <p:cNvPr id="8" name="文本框 3"/>
           <p:cNvSpPr txBox="1">
             <a:spLocks noChangeArrowheads="1"/>
           </p:cNvSpPr>
@@ -43873,8 +43834,8 @@
         </p:nvSpPr>
         <p:spPr bwMode="auto">
           <a:xfrm>
-            <a:off x="8361044" y="3038475"/>
-            <a:ext cx="9523729" cy="6185535"/>
+            <a:off x="8411845" y="2197735"/>
+            <a:ext cx="9905365" cy="6185535"/>
           </a:xfrm>
           <a:prstGeom prst="rect">
             <a:avLst/>
@@ -43896,7 +43857,7 @@
               </a:lnSpc>
             </a:pPr>
             <a:r>
-              <a:rPr lang="en-US" altLang="zh-CN" sz="6600" b="1" dirty="0" smtClean="0">
+              <a:rPr lang="en-US" altLang="zh-CN" sz="8800" b="1" dirty="0" smtClean="0">
                 <a:solidFill>
                   <a:srgbClr val="3B3B3B"/>
                 </a:solidFill>
@@ -43905,7 +43866,7 @@
               </a:rPr>
               <a:t>Guava is to Java What Curator is to Zookeeper</a:t>
             </a:r>
-            <a:endParaRPr lang="en-US" altLang="zh-CN" sz="6600" b="1" dirty="0" smtClean="0">
+            <a:endParaRPr lang="en-US" altLang="zh-CN" sz="8800" b="1" dirty="0" smtClean="0">
               <a:solidFill>
                 <a:srgbClr val="3B3B3B"/>
               </a:solidFill>
@@ -43913,22 +43874,118 @@
               <a:ea typeface="微软雅黑" panose="020B0503020204020204" charset="-122"/>
             </a:endParaRPr>
           </a:p>
-          <a:p>
-            <a:pPr>
+        </p:txBody>
+      </p:sp>
+      <p:sp>
+        <p:nvSpPr>
+          <p:cNvPr id="10" name="Text Box 9"/>
+          <p:cNvSpPr txBox="1"/>
+          <p:nvPr/>
+        </p:nvSpPr>
+        <p:spPr>
+          <a:xfrm>
+            <a:off x="855345" y="8876030"/>
+            <a:ext cx="6188075" cy="575310"/>
+          </a:xfrm>
+          <a:prstGeom prst="rect">
+            <a:avLst/>
+          </a:prstGeom>
+          <a:noFill/>
+          <a:ln w="12700" cap="flat">
+            <a:noFill/>
+            <a:miter lim="400000"/>
+          </a:ln>
+        </p:spPr>
+        <p:style>
+          <a:lnRef idx="0">
+            <a:scrgbClr r="0" g="0" b="0"/>
+          </a:lnRef>
+          <a:fillRef idx="0">
+            <a:scrgbClr r="0" g="0" b="0"/>
+          </a:fillRef>
+          <a:effectRef idx="0">
+            <a:scrgbClr r="0" g="0" b="0"/>
+          </a:effectRef>
+          <a:fontRef idx="none"/>
+        </p:style>
+        <p:txBody>
+          <a:bodyPr rot="0" vertOverflow="overflow" horzOverflow="overflow" vert="horz" wrap="none" lIns="50800" tIns="50800" rIns="50800" bIns="50800" numCol="1" spcCol="38100" rtlCol="0" anchor="ctr" forceAA="0">
+            <a:spAutoFit/>
+          </a:bodyPr>
+          <a:p>
+            <a:pPr marL="0" marR="0" indent="0" algn="l" defTabSz="662940" rtl="0" fontAlgn="auto" latinLnBrk="0" hangingPunct="0">
               <a:lnSpc>
-                <a:spcPct val="150000"/>
+                <a:spcPct val="110000"/>
               </a:lnSpc>
+              <a:spcBef>
+                <a:spcPts val="0"/>
+              </a:spcBef>
+              <a:spcAft>
+                <a:spcPts val="0"/>
+              </a:spcAft>
+              <a:buClrTx/>
+              <a:buSzTx/>
+              <a:buFontTx/>
+              <a:buNone/>
             </a:pPr>
-            <a:endParaRPr lang="en-US" altLang="zh-CN" sz="6600" b="1" dirty="0" smtClean="0">
+            <a:r>
+              <a:rPr kumimoji="0" lang="en-US" sz="2800" b="0" i="0" u="none" strike="noStrike" cap="none" spc="60" normalizeH="0" baseline="0">
+                <a:ln>
+                  <a:noFill/>
+                </a:ln>
+                <a:solidFill>
+                  <a:schemeClr val="bg1"/>
+                </a:solidFill>
+                <a:effectLst/>
+                <a:uFillTx/>
+                <a:latin typeface="微软雅黑" panose="020B0503020204020204" charset="-122"/>
+                <a:ea typeface="微软雅黑" panose="020B0503020204020204" charset="-122"/>
+                <a:cs typeface="微软雅黑" panose="020B0503020204020204" charset="-122"/>
+                <a:sym typeface="微软雅黑" panose="020B0503020204020204" charset="-122"/>
+              </a:rPr>
+              <a:t>Patrick Hunt ,Zookeeper commiter</a:t>
+            </a:r>
+            <a:endParaRPr kumimoji="0" lang="en-US" sz="2800" b="0" i="0" u="none" strike="noStrike" cap="none" spc="60" normalizeH="0" baseline="0">
+              <a:ln>
+                <a:noFill/>
+              </a:ln>
               <a:solidFill>
-                <a:srgbClr val="3B3B3B"/>
+                <a:schemeClr val="bg1"/>
               </a:solidFill>
+              <a:effectLst/>
+              <a:uFillTx/>
               <a:latin typeface="微软雅黑" panose="020B0503020204020204" charset="-122"/>
               <a:ea typeface="微软雅黑" panose="020B0503020204020204" charset="-122"/>
+              <a:cs typeface="微软雅黑" panose="020B0503020204020204" charset="-122"/>
+              <a:sym typeface="微软雅黑" panose="020B0503020204020204" charset="-122"/>
             </a:endParaRPr>
           </a:p>
         </p:txBody>
       </p:sp>
+      <p:pic>
+        <p:nvPicPr>
+          <p:cNvPr id="11" name="Picture 10"/>
+          <p:cNvPicPr>
+            <a:picLocks noChangeAspect="1"/>
+          </p:cNvPicPr>
+          <p:nvPr/>
+        </p:nvPicPr>
+        <p:blipFill>
+          <a:blip r:embed="rId1"/>
+          <a:stretch>
+            <a:fillRect/>
+          </a:stretch>
+        </p:blipFill>
+        <p:spPr>
+          <a:xfrm>
+            <a:off x="855345" y="2197735"/>
+            <a:ext cx="6188710" cy="6185535"/>
+          </a:xfrm>
+          <a:prstGeom prst="rect">
+            <a:avLst/>
+          </a:prstGeom>
+        </p:spPr>
+      </p:pic>
     </p:spTree>
   </p:cSld>
   <p:clrMapOvr>
@@ -46825,7 +46882,7 @@
         </p:nvSpPr>
         <p:spPr>
           <a:xfrm>
-            <a:off x="1268095" y="7897495"/>
+            <a:off x="855345" y="7921625"/>
             <a:ext cx="18325465" cy="1724660"/>
           </a:xfrm>
           <a:prstGeom prst="rect">
@@ -47244,7 +47301,7 @@
                   <a:schemeClr val="bg1"/>
                 </a:solidFill>
               </a:rPr>
-              <a:t>1. Factory Method</a:t>
+              <a:t>1. Factory</a:t>
             </a:r>
             <a:endParaRPr sz="2800" b="1" dirty="0" smtClean="0">
               <a:solidFill>

</xml_diff>

<commit_message>
feat:(docs) complate zh-cn/urator-internal-implementation-mechanism.md article
</commit_message>
<xml_diff>
--- a/docs/assets/images/curator-internal-implementation-mechanism/Curator internal implementation mechanism-Anigkus.pptx
+++ b/docs/assets/images/curator-internal-implementation-mechanism/Curator internal implementation mechanism-Anigkus.pptx
@@ -8,7 +8,7 @@
     <p:notesMasterId r:id="rId4"/>
   </p:notesMasterIdLst>
   <p:handoutMasterIdLst>
-    <p:handoutMasterId r:id="rId54"/>
+    <p:handoutMasterId r:id="rId56"/>
   </p:handoutMasterIdLst>
   <p:sldIdLst>
     <p:sldId id="347" r:id="rId3"/>
@@ -50,17 +50,19 @@
     <p:sldId id="432" r:id="rId40"/>
     <p:sldId id="433" r:id="rId41"/>
     <p:sldId id="470" r:id="rId42"/>
-    <p:sldId id="403" r:id="rId43"/>
-    <p:sldId id="434" r:id="rId44"/>
-    <p:sldId id="435" r:id="rId45"/>
-    <p:sldId id="437" r:id="rId46"/>
-    <p:sldId id="438" r:id="rId47"/>
-    <p:sldId id="439" r:id="rId48"/>
-    <p:sldId id="440" r:id="rId49"/>
-    <p:sldId id="441" r:id="rId50"/>
-    <p:sldId id="442" r:id="rId51"/>
-    <p:sldId id="443" r:id="rId52"/>
-    <p:sldId id="346" r:id="rId53"/>
+    <p:sldId id="500" r:id="rId43"/>
+    <p:sldId id="403" r:id="rId44"/>
+    <p:sldId id="434" r:id="rId45"/>
+    <p:sldId id="435" r:id="rId46"/>
+    <p:sldId id="437" r:id="rId47"/>
+    <p:sldId id="438" r:id="rId48"/>
+    <p:sldId id="439" r:id="rId49"/>
+    <p:sldId id="440" r:id="rId50"/>
+    <p:sldId id="441" r:id="rId51"/>
+    <p:sldId id="442" r:id="rId52"/>
+    <p:sldId id="501" r:id="rId53"/>
+    <p:sldId id="443" r:id="rId54"/>
+    <p:sldId id="346" r:id="rId55"/>
   </p:sldIdLst>
   <p:sldSz cx="19799935" cy="10796270"/>
   <p:notesSz cx="6858000" cy="9144000"/>
@@ -3251,12 +3253,7 @@
             <p:ph type="sldImg"/>
           </p:nvPr>
         </p:nvSpPr>
-        <p:spPr>
-          <a:xfrm>
-            <a:off x="685800" y="1143000"/>
-            <a:ext cx="5486400" cy="3086100"/>
-          </a:xfrm>
-        </p:spPr>
+        <p:spPr/>
       </p:sp>
       <p:sp>
         <p:nvSpPr>
@@ -3273,18 +3270,20 @@
           <a:bodyPr/>
           <a:lstStyle/>
           <a:p>
-            <a:endParaRPr kumimoji="1" lang="zh-CN" altLang="en-US"/>
+            <a:endParaRPr lang="zh-CN" altLang="en-US" dirty="0" smtClean="0">
+              <a:sym typeface="+mn-ea"/>
+            </a:endParaRPr>
           </a:p>
         </p:txBody>
       </p:sp>
       <p:sp>
         <p:nvSpPr>
-          <p:cNvPr id="4" name="幻灯片编号占位符 3"/>
+          <p:cNvPr id="4" name="灯片编号占位符 3"/>
           <p:cNvSpPr>
             <a:spLocks noGrp="1"/>
           </p:cNvSpPr>
           <p:nvPr>
-            <p:ph type="sldNum" sz="quarter" idx="10"/>
+            <p:ph type="sldNum" sz="quarter" idx="5"/>
           </p:nvPr>
         </p:nvSpPr>
         <p:spPr/>
@@ -3292,7 +3291,7 @@
           <a:bodyPr/>
           <a:lstStyle/>
           <a:p>
-            <a:fld id="{A6837353-30EB-4A48-80EB-173D804AEFBD}" type="slidenum">
+            <a:fld id="{6AB0AEAF-949B-430C-A6CD-7D333EF100C1}" type="slidenum">
               <a:rPr lang="zh-CN" altLang="en-US" smtClean="0"/>
             </a:fld>
             <a:endParaRPr lang="zh-CN" altLang="en-US"/>
@@ -3334,7 +3333,12 @@
             <p:ph type="sldImg"/>
           </p:nvPr>
         </p:nvSpPr>
-        <p:spPr/>
+        <p:spPr>
+          <a:xfrm>
+            <a:off x="685800" y="1143000"/>
+            <a:ext cx="5486400" cy="3086100"/>
+          </a:xfrm>
+        </p:spPr>
       </p:sp>
       <p:sp>
         <p:nvSpPr>
@@ -3351,20 +3355,18 @@
           <a:bodyPr/>
           <a:lstStyle/>
           <a:p>
-            <a:endParaRPr lang="zh-CN" altLang="en-US" dirty="0" smtClean="0">
-              <a:sym typeface="+mn-ea"/>
-            </a:endParaRPr>
+            <a:endParaRPr kumimoji="1" lang="zh-CN" altLang="en-US"/>
           </a:p>
         </p:txBody>
       </p:sp>
       <p:sp>
         <p:nvSpPr>
-          <p:cNvPr id="4" name="灯片编号占位符 3"/>
+          <p:cNvPr id="4" name="幻灯片编号占位符 3"/>
           <p:cNvSpPr>
             <a:spLocks noGrp="1"/>
           </p:cNvSpPr>
           <p:nvPr>
-            <p:ph type="sldNum" sz="quarter" idx="5"/>
+            <p:ph type="sldNum" sz="quarter" idx="10"/>
           </p:nvPr>
         </p:nvSpPr>
         <p:spPr/>
@@ -3372,7 +3374,7 @@
           <a:bodyPr/>
           <a:lstStyle/>
           <a:p>
-            <a:fld id="{6AB0AEAF-949B-430C-A6CD-7D333EF100C1}" type="slidenum">
+            <a:fld id="{A6837353-30EB-4A48-80EB-173D804AEFBD}" type="slidenum">
               <a:rPr lang="zh-CN" altLang="en-US" smtClean="0"/>
             </a:fld>
             <a:endParaRPr lang="zh-CN" altLang="en-US"/>
@@ -4026,6 +4028,166 @@
 </file>
 
 <file path=ppt/notesSlides/notesSlide47.xml><?xml version="1.0" encoding="utf-8"?>
+<p:notes xmlns:a="http://schemas.openxmlformats.org/drawingml/2006/main" xmlns:r="http://schemas.openxmlformats.org/officeDocument/2006/relationships" xmlns:p="http://schemas.openxmlformats.org/presentationml/2006/main">
+  <p:cSld>
+    <p:spTree>
+      <p:nvGrpSpPr>
+        <p:cNvPr id="1" name=""/>
+        <p:cNvGrpSpPr/>
+        <p:nvPr/>
+      </p:nvGrpSpPr>
+      <p:grpSpPr>
+        <a:xfrm>
+          <a:off x="0" y="0"/>
+          <a:ext cx="0" cy="0"/>
+          <a:chOff x="0" y="0"/>
+          <a:chExt cx="0" cy="0"/>
+        </a:xfrm>
+      </p:grpSpPr>
+      <p:sp>
+        <p:nvSpPr>
+          <p:cNvPr id="2" name="幻灯片图像占位符 1"/>
+          <p:cNvSpPr>
+            <a:spLocks noGrp="1" noRot="1" noChangeAspect="1"/>
+          </p:cNvSpPr>
+          <p:nvPr>
+            <p:ph type="sldImg"/>
+          </p:nvPr>
+        </p:nvSpPr>
+        <p:spPr/>
+      </p:sp>
+      <p:sp>
+        <p:nvSpPr>
+          <p:cNvPr id="3" name="备注占位符 2"/>
+          <p:cNvSpPr>
+            <a:spLocks noGrp="1"/>
+          </p:cNvSpPr>
+          <p:nvPr>
+            <p:ph type="body" idx="1"/>
+          </p:nvPr>
+        </p:nvSpPr>
+        <p:spPr/>
+        <p:txBody>
+          <a:bodyPr/>
+          <a:lstStyle/>
+          <a:p>
+            <a:endParaRPr lang="zh-CN" altLang="en-US" dirty="0" smtClean="0">
+              <a:sym typeface="+mn-ea"/>
+            </a:endParaRPr>
+          </a:p>
+        </p:txBody>
+      </p:sp>
+      <p:sp>
+        <p:nvSpPr>
+          <p:cNvPr id="4" name="灯片编号占位符 3"/>
+          <p:cNvSpPr>
+            <a:spLocks noGrp="1"/>
+          </p:cNvSpPr>
+          <p:nvPr>
+            <p:ph type="sldNum" sz="quarter" idx="5"/>
+          </p:nvPr>
+        </p:nvSpPr>
+        <p:spPr/>
+        <p:txBody>
+          <a:bodyPr/>
+          <a:lstStyle/>
+          <a:p>
+            <a:fld id="{6AB0AEAF-949B-430C-A6CD-7D333EF100C1}" type="slidenum">
+              <a:rPr lang="zh-CN" altLang="en-US" smtClean="0"/>
+            </a:fld>
+            <a:endParaRPr lang="zh-CN" altLang="en-US"/>
+          </a:p>
+        </p:txBody>
+      </p:sp>
+    </p:spTree>
+  </p:cSld>
+  <p:clrMapOvr>
+    <a:masterClrMapping/>
+  </p:clrMapOvr>
+</p:notes>
+</file>
+
+<file path=ppt/notesSlides/notesSlide48.xml><?xml version="1.0" encoding="utf-8"?>
+<p:notes xmlns:a="http://schemas.openxmlformats.org/drawingml/2006/main" xmlns:r="http://schemas.openxmlformats.org/officeDocument/2006/relationships" xmlns:p="http://schemas.openxmlformats.org/presentationml/2006/main">
+  <p:cSld>
+    <p:spTree>
+      <p:nvGrpSpPr>
+        <p:cNvPr id="1" name=""/>
+        <p:cNvGrpSpPr/>
+        <p:nvPr/>
+      </p:nvGrpSpPr>
+      <p:grpSpPr>
+        <a:xfrm>
+          <a:off x="0" y="0"/>
+          <a:ext cx="0" cy="0"/>
+          <a:chOff x="0" y="0"/>
+          <a:chExt cx="0" cy="0"/>
+        </a:xfrm>
+      </p:grpSpPr>
+      <p:sp>
+        <p:nvSpPr>
+          <p:cNvPr id="2" name="幻灯片图像占位符 1"/>
+          <p:cNvSpPr>
+            <a:spLocks noGrp="1" noRot="1" noChangeAspect="1"/>
+          </p:cNvSpPr>
+          <p:nvPr>
+            <p:ph type="sldImg"/>
+          </p:nvPr>
+        </p:nvSpPr>
+        <p:spPr/>
+      </p:sp>
+      <p:sp>
+        <p:nvSpPr>
+          <p:cNvPr id="3" name="备注占位符 2"/>
+          <p:cNvSpPr>
+            <a:spLocks noGrp="1"/>
+          </p:cNvSpPr>
+          <p:nvPr>
+            <p:ph type="body" idx="1"/>
+          </p:nvPr>
+        </p:nvSpPr>
+        <p:spPr/>
+        <p:txBody>
+          <a:bodyPr/>
+          <a:lstStyle/>
+          <a:p>
+            <a:endParaRPr lang="zh-CN" altLang="en-US" dirty="0" smtClean="0">
+              <a:sym typeface="+mn-ea"/>
+            </a:endParaRPr>
+          </a:p>
+        </p:txBody>
+      </p:sp>
+      <p:sp>
+        <p:nvSpPr>
+          <p:cNvPr id="4" name="灯片编号占位符 3"/>
+          <p:cNvSpPr>
+            <a:spLocks noGrp="1"/>
+          </p:cNvSpPr>
+          <p:nvPr>
+            <p:ph type="sldNum" sz="quarter" idx="5"/>
+          </p:nvPr>
+        </p:nvSpPr>
+        <p:spPr/>
+        <p:txBody>
+          <a:bodyPr/>
+          <a:lstStyle/>
+          <a:p>
+            <a:fld id="{6AB0AEAF-949B-430C-A6CD-7D333EF100C1}" type="slidenum">
+              <a:rPr lang="zh-CN" altLang="en-US" smtClean="0"/>
+            </a:fld>
+            <a:endParaRPr lang="zh-CN" altLang="en-US"/>
+          </a:p>
+        </p:txBody>
+      </p:sp>
+    </p:spTree>
+  </p:cSld>
+  <p:clrMapOvr>
+    <a:masterClrMapping/>
+  </p:clrMapOvr>
+</p:notes>
+</file>
+
+<file path=ppt/notesSlides/notesSlide49.xml><?xml version="1.0" encoding="utf-8"?>
 <p:notes xmlns:a="http://schemas.openxmlformats.org/drawingml/2006/main" xmlns:r="http://schemas.openxmlformats.org/officeDocument/2006/relationships" xmlns:p="http://schemas.openxmlformats.org/presentationml/2006/main">
   <p:cSld>
     <p:spTree>
@@ -8251,7 +8413,7 @@
                             <a:schemeClr val="bg1"/>
                           </a:solidFill>
                         </a:rPr>
-                        <a:t>nternal mechanism</a:t>
+                        <a:t>nternal implementation</a:t>
                       </a:r>
                       <a:endParaRPr lang="zh-CN" altLang="en-US" sz="2400" dirty="0" smtClean="0">
                         <a:solidFill>
@@ -8615,7 +8777,25 @@
                           </a:solidFill>
                           <a:effectLst/>
                         </a:rPr>
-                        <a:t>Start the delete operation. Call </a:t>
+                        <a:t>Start the delete operation</a:t>
+                      </a:r>
+                      <a:r>
+                        <a:rPr lang="en-US" sz="2400" dirty="0">
+                          <a:solidFill>
+                            <a:schemeClr val="bg1"/>
+                          </a:solidFill>
+                          <a:effectLst/>
+                        </a:rPr>
+                        <a:t>,</a:t>
+                      </a:r>
+                      <a:r>
+                        <a:rPr sz="2400" dirty="0">
+                          <a:solidFill>
+                            <a:schemeClr val="bg1"/>
+                          </a:solidFill>
+                          <a:effectLst/>
+                        </a:rPr>
+                        <a:t> Call </a:t>
                       </a:r>
                       <a:r>
                         <a:rPr sz="2400" dirty="0">
@@ -8779,7 +8959,25 @@
                           </a:solidFill>
                           <a:effectLst/>
                         </a:rPr>
-                        <a:t>Begin the operation of checking whether the ZNode exists. At the end, call </a:t>
+                        <a:t>Begin the operation of checking whether the ZNode exists</a:t>
+                      </a:r>
+                      <a:r>
+                        <a:rPr lang="en-US" sz="2400" dirty="0">
+                          <a:solidFill>
+                            <a:schemeClr val="bg1"/>
+                          </a:solidFill>
+                          <a:effectLst/>
+                        </a:rPr>
+                        <a:t>,</a:t>
+                      </a:r>
+                      <a:r>
+                        <a:rPr sz="2400" dirty="0">
+                          <a:solidFill>
+                            <a:schemeClr val="bg1"/>
+                          </a:solidFill>
+                          <a:effectLst/>
+                        </a:rPr>
+                        <a:t>At the end, call </a:t>
                       </a:r>
                       <a:r>
                         <a:rPr sz="2400" dirty="0">
@@ -9271,7 +9469,25 @@
                           </a:solidFill>
                           <a:effectLst/>
                         </a:rPr>
-                        <a:t>Start getting the list of child nodes of ZNode. Call </a:t>
+                        <a:t>Start getting the list of child nodes of ZNode</a:t>
+                      </a:r>
+                      <a:r>
+                        <a:rPr lang="en-US" sz="2400" dirty="0">
+                          <a:solidFill>
+                            <a:schemeClr val="bg1"/>
+                          </a:solidFill>
+                          <a:effectLst/>
+                        </a:rPr>
+                        <a:t>,</a:t>
+                      </a:r>
+                      <a:r>
+                        <a:rPr sz="2400" dirty="0">
+                          <a:solidFill>
+                            <a:schemeClr val="bg1"/>
+                          </a:solidFill>
+                          <a:effectLst/>
+                        </a:rPr>
+                        <a:t> Call </a:t>
                       </a:r>
                       <a:r>
                         <a:rPr sz="2400" dirty="0">
@@ -10727,7 +10943,7 @@
         <p:spPr>
           <a:xfrm>
             <a:off x="8896983" y="7332980"/>
-            <a:ext cx="9259568" cy="2579370"/>
+            <a:ext cx="9259568" cy="2081530"/>
           </a:xfrm>
           <a:prstGeom prst="rect">
             <a:avLst/>
@@ -10745,37 +10961,7 @@
                   <a:schemeClr val="bg1"/>
                 </a:solidFill>
               </a:rPr>
-              <a:t>Different processes cannot take advantage of the atomic value of jdk's concurrent packets.</a:t>
-            </a:r>
-            <a:endParaRPr sz="2940" dirty="0" smtClean="0">
-              <a:solidFill>
-                <a:schemeClr val="bg1"/>
-              </a:solidFill>
-            </a:endParaRPr>
-          </a:p>
-          <a:p>
-            <a:r>
-              <a:rPr sz="2940" dirty="0" smtClean="0">
-                <a:solidFill>
-                  <a:schemeClr val="bg1"/>
-                </a:solidFill>
-              </a:rPr>
-              <a:t>Curator's atomic provides similar functionality, within a distributed environment,</a:t>
-            </a:r>
-            <a:endParaRPr sz="2940" dirty="0" smtClean="0">
-              <a:solidFill>
-                <a:schemeClr val="bg1"/>
-              </a:solidFill>
-            </a:endParaRPr>
-          </a:p>
-          <a:p>
-            <a:r>
-              <a:rPr sz="2940" dirty="0" smtClean="0">
-                <a:solidFill>
-                  <a:schemeClr val="bg1"/>
-                </a:solidFill>
-              </a:rPr>
-              <a:t>share the same atomic value</a:t>
+              <a:t>Different processes cannot use the atomic value of jdk's concurrent packets. Curator's atomic provides a similar function, sharing the same atomic value in a distributed environment.</a:t>
             </a:r>
             <a:endParaRPr sz="2940" dirty="0" smtClean="0">
               <a:solidFill>
@@ -12686,7 +12872,23 @@
                   <a:schemeClr val="bg1"/>
                 </a:solidFill>
               </a:rPr>
-              <a:t>Multiple distributions on different machines perform concurrent operations on the same atomic variable. All other machines can see the latest value.</a:t>
+              <a:t>Multiple distributions on different machines perform concurrent operations on the same atomic variable</a:t>
+            </a:r>
+            <a:r>
+              <a:rPr lang="en-US" altLang="zh-CN" sz="4200" dirty="0">
+                <a:solidFill>
+                  <a:schemeClr val="bg1"/>
+                </a:solidFill>
+              </a:rPr>
+              <a:t>,</a:t>
+            </a:r>
+            <a:r>
+              <a:rPr lang="zh-CN" altLang="en-US" sz="4200" dirty="0">
+                <a:solidFill>
+                  <a:schemeClr val="bg1"/>
+                </a:solidFill>
+              </a:rPr>
+              <a:t> All other machines can see the latest value.</a:t>
             </a:r>
             <a:endParaRPr lang="zh-CN" altLang="en-US" sz="4200" dirty="0">
               <a:solidFill>
@@ -13409,12 +13611,13 @@
                 </a:solidFill>
                 <a:sym typeface="+mn-ea"/>
               </a:rPr>
-              <a:t>In the same process, multiple threads use the lock provided by java concurrent package to ensure the shared lock of multiple threads</a:t>
+              <a:t>In the same process, multiple threads use the lock provided by java concurrent package to ensure the shared lock of multiple threads.</a:t>
             </a:r>
             <a:endParaRPr sz="2940" dirty="0">
               <a:solidFill>
                 <a:schemeClr val="bg1"/>
               </a:solidFill>
+              <a:sym typeface="+mn-ea"/>
             </a:endParaRPr>
           </a:p>
         </p:txBody>
@@ -13896,22 +14099,7 @@
                   <a:schemeClr val="bg1"/>
                 </a:solidFill>
               </a:rPr>
-              <a:t>Different processes cannot use the lock of the jdk concurrent package.</a:t>
-            </a:r>
-            <a:endParaRPr sz="2940" dirty="0" smtClean="0">
-              <a:solidFill>
-                <a:schemeClr val="bg1"/>
-              </a:solidFill>
-            </a:endParaRPr>
-          </a:p>
-          <a:p>
-            <a:r>
-              <a:rPr sz="2940" dirty="0" smtClean="0">
-                <a:solidFill>
-                  <a:schemeClr val="bg1"/>
-                </a:solidFill>
-              </a:rPr>
-              <a:t>Curator's locks provide a similar function to handle global locks in a distributed environment</a:t>
+              <a:t>Different processes cannot use the locks of JDK's concurrent packets. Curator's locks provide a similar function to process global locks in a distributed environment.</a:t>
             </a:r>
             <a:endParaRPr sz="2940" dirty="0" smtClean="0">
               <a:solidFill>
@@ -23398,6 +23586,17 @@
 <file path=ppt/slides/slide28.xml><?xml version="1.0" encoding="utf-8"?>
 <p:sld xmlns:a="http://schemas.openxmlformats.org/drawingml/2006/main" xmlns:r="http://schemas.openxmlformats.org/officeDocument/2006/relationships" xmlns:p="http://schemas.openxmlformats.org/presentationml/2006/main" show="0">
   <p:cSld>
+    <p:bg>
+      <p:bgPr>
+        <a:solidFill>
+          <a:schemeClr val="bg1">
+            <a:lumMod val="10000"/>
+            <a:lumOff val="90000"/>
+          </a:schemeClr>
+        </a:solidFill>
+        <a:effectLst/>
+      </p:bgPr>
+    </p:bg>
     <p:spTree>
       <p:nvGrpSpPr>
         <p:cNvPr id="1" name=""/>
@@ -28737,6 +28936,17 @@
 <file path=ppt/slides/slide30.xml><?xml version="1.0" encoding="utf-8"?>
 <p:sld xmlns:a="http://schemas.openxmlformats.org/drawingml/2006/main" xmlns:r="http://schemas.openxmlformats.org/officeDocument/2006/relationships" xmlns:p="http://schemas.openxmlformats.org/presentationml/2006/main" show="0">
   <p:cSld>
+    <p:bg>
+      <p:bgPr>
+        <a:solidFill>
+          <a:schemeClr val="bg1">
+            <a:lumMod val="10000"/>
+            <a:lumOff val="90000"/>
+          </a:schemeClr>
+        </a:solidFill>
+        <a:effectLst/>
+      </p:bgPr>
+    </p:bg>
     <p:spTree>
       <p:nvGrpSpPr>
         <p:cNvPr id="1" name=""/>
@@ -32334,7 +32544,7 @@
         <p:spPr>
           <a:xfrm>
             <a:off x="638175" y="2196465"/>
-            <a:ext cx="10576560" cy="7397115"/>
+            <a:ext cx="10576560" cy="6991350"/>
           </a:xfrm>
           <a:prstGeom prst="rect">
             <a:avLst/>
@@ -32418,22 +32628,7 @@
                   <a:schemeClr val="bg1"/>
                 </a:solidFill>
               </a:rPr>
-              <a:t>LOST: When the reconnection times out or the Session times out.</a:t>
-            </a:r>
-            <a:endParaRPr sz="2400" dirty="0" smtClean="0">
-              <a:solidFill>
-                <a:schemeClr val="bg1"/>
-              </a:solidFill>
-            </a:endParaRPr>
-          </a:p>
-          <a:p>
-            <a:r>
-              <a:rPr sz="2400" dirty="0" smtClean="0">
-                <a:solidFill>
-                  <a:schemeClr val="bg1"/>
-                </a:solidFill>
-              </a:rPr>
-              <a:t>A LOST event occurs when:</a:t>
+              <a:t>LOST: When the reconnection times out or the Session times out. The LOST event occurs in the following cases:</a:t>
             </a:r>
             <a:endParaRPr sz="2400" dirty="0" smtClean="0">
               <a:solidFill>
@@ -32485,22 +32680,7 @@
                   <a:schemeClr val="tx1"/>
                 </a:solidFill>
               </a:rPr>
-              <a:t>Note: Since there is a bug in curator version 3.0 and below, if</a:t>
-            </a:r>
-            <a:endParaRPr sz="2400" dirty="0" smtClean="0">
-              <a:solidFill>
-                <a:schemeClr val="tx1"/>
-              </a:solidFill>
-            </a:endParaRPr>
-          </a:p>
-          <a:p>
-            <a:r>
-              <a:rPr sz="2400" dirty="0" smtClean="0">
-                <a:solidFill>
-                  <a:schemeClr val="tx1"/>
-                </a:solidFill>
-              </a:rPr>
-              <a:t>In the same situation as connectionTimeoutMs and sessionTimeoutMs, it takes more than twice the time to receive LOST status and events.</a:t>
+              <a:t>Note: Due to a bug in curator version 3.0 and below, if connectionTimeoutMs is the same as sessionTimeoutMs, it will take more than twice the time to receive LOST status and events.</a:t>
             </a:r>
             <a:endParaRPr sz="2400" dirty="0" smtClean="0">
               <a:solidFill>
@@ -33319,6 +33499,17 @@
 <file path=ppt/slides/slide33.xml><?xml version="1.0" encoding="utf-8"?>
 <p:sld xmlns:a="http://schemas.openxmlformats.org/drawingml/2006/main" xmlns:r="http://schemas.openxmlformats.org/officeDocument/2006/relationships" xmlns:p="http://schemas.openxmlformats.org/presentationml/2006/main" show="0">
   <p:cSld>
+    <p:bg>
+      <p:bgPr>
+        <a:solidFill>
+          <a:schemeClr val="bg1">
+            <a:lumMod val="10000"/>
+            <a:lumOff val="90000"/>
+          </a:schemeClr>
+        </a:solidFill>
+        <a:effectLst/>
+      </p:bgPr>
+    </p:bg>
     <p:spTree>
       <p:nvGrpSpPr>
         <p:cNvPr id="1" name=""/>
@@ -35573,6 +35764,17 @@
 <file path=ppt/slides/slide36.xml><?xml version="1.0" encoding="utf-8"?>
 <p:sld xmlns:a="http://schemas.openxmlformats.org/drawingml/2006/main" xmlns:r="http://schemas.openxmlformats.org/officeDocument/2006/relationships" xmlns:p="http://schemas.openxmlformats.org/presentationml/2006/main" show="0">
   <p:cSld>
+    <p:bg>
+      <p:bgPr>
+        <a:solidFill>
+          <a:schemeClr val="bg1">
+            <a:lumMod val="10000"/>
+            <a:lumOff val="90000"/>
+          </a:schemeClr>
+        </a:solidFill>
+        <a:effectLst/>
+      </p:bgPr>
+    </p:bg>
     <p:spTree>
       <p:nvGrpSpPr>
         <p:cNvPr id="1" name=""/>
@@ -39302,6 +39504,17 @@
 <file path=ppt/slides/slide39.xml><?xml version="1.0" encoding="utf-8"?>
 <p:sld xmlns:a="http://schemas.openxmlformats.org/drawingml/2006/main" xmlns:r="http://schemas.openxmlformats.org/officeDocument/2006/relationships" xmlns:p="http://schemas.openxmlformats.org/presentationml/2006/main" show="0">
   <p:cSld>
+    <p:bg>
+      <p:bgPr>
+        <a:solidFill>
+          <a:schemeClr val="bg1">
+            <a:lumMod val="10000"/>
+            <a:lumOff val="90000"/>
+          </a:schemeClr>
+        </a:solidFill>
+        <a:effectLst/>
+      </p:bgPr>
+    </p:bg>
     <p:spTree>
       <p:nvGrpSpPr>
         <p:cNvPr id="1" name=""/>
@@ -39316,856 +39529,39 @@
           <a:chExt cx="0" cy="0"/>
         </a:xfrm>
       </p:grpSpPr>
-      <p:sp>
-        <p:nvSpPr>
-          <p:cNvPr id="33" name="流程图: 联系 6"/>
-          <p:cNvSpPr/>
+      <p:pic>
+        <p:nvPicPr>
+          <p:cNvPr id="57" name="Picture 2"/>
+          <p:cNvPicPr>
+            <a:picLocks noChangeAspect="1" noChangeArrowheads="1"/>
+          </p:cNvPicPr>
           <p:nvPr/>
-        </p:nvSpPr>
-        <p:spPr>
+        </p:nvPicPr>
+        <p:blipFill>
+          <a:blip r:embed="rId1"/>
+          <a:srcRect/>
+          <a:stretch>
+            <a:fillRect/>
+          </a:stretch>
+        </p:blipFill>
+        <p:spPr bwMode="auto">
           <a:xfrm>
-            <a:off x="9214978" y="130436"/>
-            <a:ext cx="1800000" cy="1800000"/>
-          </a:xfrm>
-          <a:prstGeom prst="flowChartConnector">
-            <a:avLst/>
-          </a:prstGeom>
-        </p:spPr>
-        <p:style>
-          <a:lnRef idx="1">
-            <a:schemeClr val="accent1"/>
-          </a:lnRef>
-          <a:fillRef idx="2">
-            <a:schemeClr val="accent1"/>
-          </a:fillRef>
-          <a:effectRef idx="1">
-            <a:schemeClr val="accent1"/>
-          </a:effectRef>
-          <a:fontRef idx="minor">
-            <a:schemeClr val="dk1"/>
-          </a:fontRef>
-        </p:style>
-        <p:txBody>
-          <a:bodyPr lIns="174083" tIns="87041" rIns="174083" bIns="87041" rtlCol="0" anchor="ctr"/>
-          <a:p>
-            <a:pPr algn="ctr"/>
-            <a:r>
-              <a:rPr lang="en-US" altLang="zh-CN" dirty="0">
-                <a:solidFill>
-                  <a:schemeClr val="bg1"/>
-                </a:solidFill>
-                <a:sym typeface="+mn-ea"/>
-              </a:rPr>
-              <a:t>StartUp</a:t>
-            </a:r>
-            <a:endParaRPr lang="en-US" altLang="zh-CN" dirty="0">
-              <a:solidFill>
-                <a:schemeClr val="bg1"/>
-              </a:solidFill>
-              <a:sym typeface="+mn-ea"/>
-            </a:endParaRPr>
-          </a:p>
-        </p:txBody>
-      </p:sp>
-      <p:sp>
-        <p:nvSpPr>
-          <p:cNvPr id="35" name="圆角矩形 8"/>
-          <p:cNvSpPr/>
-          <p:nvPr/>
-        </p:nvSpPr>
-        <p:spPr>
-          <a:xfrm>
-            <a:off x="649605" y="9524865"/>
-            <a:ext cx="8640000" cy="1080000"/>
-          </a:xfrm>
-          <a:prstGeom prst="roundRect">
-            <a:avLst/>
-          </a:prstGeom>
-        </p:spPr>
-        <p:style>
-          <a:lnRef idx="1">
-            <a:schemeClr val="accent1"/>
-          </a:lnRef>
-          <a:fillRef idx="2">
-            <a:schemeClr val="accent1"/>
-          </a:fillRef>
-          <a:effectRef idx="1">
-            <a:schemeClr val="accent1"/>
-          </a:effectRef>
-          <a:fontRef idx="minor">
-            <a:schemeClr val="dk1"/>
-          </a:fontRef>
-        </p:style>
-        <p:txBody>
-          <a:bodyPr lIns="174083" tIns="87041" rIns="174083" bIns="87041" rtlCol="0" anchor="ctr"/>
-          <a:p>
-            <a:pPr algn="ctr"/>
-            <a:r>
-              <a:rPr sz="2400">
-                <a:solidFill>
-                  <a:schemeClr val="bg1"/>
-                </a:solidFill>
-              </a:rPr>
-              <a:t>Call back the registered TreeCacheListener</a:t>
-            </a:r>
-            <a:endParaRPr sz="2400">
-              <a:solidFill>
-                <a:schemeClr val="bg1"/>
-              </a:solidFill>
-            </a:endParaRPr>
-          </a:p>
-        </p:txBody>
-      </p:sp>
-      <p:sp>
-        <p:nvSpPr>
-          <p:cNvPr id="36" name="圆角矩形 9"/>
-          <p:cNvSpPr/>
-          <p:nvPr/>
-        </p:nvSpPr>
-        <p:spPr>
-          <a:xfrm>
-            <a:off x="649605" y="7539855"/>
-            <a:ext cx="8640000" cy="1080000"/>
-          </a:xfrm>
-          <a:prstGeom prst="roundRect">
-            <a:avLst/>
-          </a:prstGeom>
-        </p:spPr>
-        <p:style>
-          <a:lnRef idx="1">
-            <a:schemeClr val="accent1"/>
-          </a:lnRef>
-          <a:fillRef idx="2">
-            <a:schemeClr val="accent1"/>
-          </a:fillRef>
-          <a:effectRef idx="1">
-            <a:schemeClr val="accent1"/>
-          </a:effectRef>
-          <a:fontRef idx="minor">
-            <a:schemeClr val="dk1"/>
-          </a:fontRef>
-        </p:style>
-        <p:txBody>
-          <a:bodyPr lIns="174083" tIns="87041" rIns="174083" bIns="87041" rtlCol="0" anchor="ctr"/>
-          <a:p>
-            <a:pPr algn="ctr"/>
-            <a:r>
-              <a:rPr sz="2400" dirty="0" smtClean="0">
-                <a:solidFill>
-                  <a:schemeClr val="bg1"/>
-                </a:solidFill>
-              </a:rPr>
-              <a:t>Add child node listeners via getChildren</a:t>
-            </a:r>
-            <a:endParaRPr sz="2400" dirty="0" smtClean="0">
-              <a:solidFill>
-                <a:schemeClr val="bg1"/>
-              </a:solidFill>
-            </a:endParaRPr>
-          </a:p>
-        </p:txBody>
-      </p:sp>
-      <p:sp>
-        <p:nvSpPr>
-          <p:cNvPr id="37" name="圆角矩形 10"/>
-          <p:cNvSpPr/>
-          <p:nvPr/>
-        </p:nvSpPr>
-        <p:spPr>
-          <a:xfrm>
-            <a:off x="11014710" y="6086475"/>
-            <a:ext cx="8640000" cy="1080000"/>
-          </a:xfrm>
-          <a:prstGeom prst="roundRect">
-            <a:avLst/>
-          </a:prstGeom>
-        </p:spPr>
-        <p:style>
-          <a:lnRef idx="1">
-            <a:schemeClr val="accent1"/>
-          </a:lnRef>
-          <a:fillRef idx="2">
-            <a:schemeClr val="accent1"/>
-          </a:fillRef>
-          <a:effectRef idx="1">
-            <a:schemeClr val="accent1"/>
-          </a:effectRef>
-          <a:fontRef idx="minor">
-            <a:schemeClr val="dk1"/>
-          </a:fontRef>
-        </p:style>
-        <p:txBody>
-          <a:bodyPr lIns="174083" tIns="87041" rIns="174083" bIns="87041" rtlCol="0" anchor="ctr"/>
-          <a:p>
-            <a:pPr algn="ctr"/>
-            <a:r>
-              <a:rPr sz="2400" dirty="0" smtClean="0">
-                <a:solidFill>
-                  <a:schemeClr val="bg1"/>
-                </a:solidFill>
-              </a:rPr>
-              <a:t>Receive events from ZkServer</a:t>
-            </a:r>
-            <a:endParaRPr sz="2400" dirty="0" smtClean="0">
-              <a:solidFill>
-                <a:schemeClr val="bg1"/>
-              </a:solidFill>
-            </a:endParaRPr>
-          </a:p>
-        </p:txBody>
-      </p:sp>
-      <p:cxnSp>
-        <p:nvCxnSpPr>
-          <p:cNvPr id="39" name="直接箭头连接符 12"/>
-          <p:cNvCxnSpPr>
-            <a:stCxn id="33" idx="2"/>
-            <a:endCxn id="41" idx="0"/>
-          </p:cNvCxnSpPr>
-          <p:nvPr/>
-        </p:nvCxnSpPr>
-        <p:spPr>
-          <a:xfrm rot="10800000" flipV="1">
-            <a:off x="4969510" y="1030605"/>
-            <a:ext cx="4245610" cy="553720"/>
-          </a:xfrm>
-          <a:prstGeom prst="bentConnector2">
-            <a:avLst/>
-          </a:prstGeom>
-          <a:ln w="28575">
-            <a:tailEnd type="arrow"/>
-          </a:ln>
-        </p:spPr>
-        <p:style>
-          <a:lnRef idx="1">
-            <a:schemeClr val="accent1"/>
-          </a:lnRef>
-          <a:fillRef idx="0">
-            <a:schemeClr val="accent1"/>
-          </a:fillRef>
-          <a:effectRef idx="0">
-            <a:schemeClr val="accent1"/>
-          </a:effectRef>
-          <a:fontRef idx="minor">
-            <a:schemeClr val="tx1"/>
-          </a:fontRef>
-        </p:style>
-      </p:cxnSp>
-      <p:cxnSp>
-        <p:nvCxnSpPr>
-          <p:cNvPr id="40" name="直接箭头连接符 65"/>
-          <p:cNvCxnSpPr>
-            <a:stCxn id="37" idx="2"/>
-            <a:endCxn id="35" idx="3"/>
-          </p:cNvCxnSpPr>
-          <p:nvPr/>
-        </p:nvCxnSpPr>
-        <p:spPr>
-          <a:xfrm rot="5400000">
-            <a:off x="10862628" y="5593398"/>
-            <a:ext cx="2898775" cy="6045200"/>
-          </a:xfrm>
-          <a:prstGeom prst="bentConnector2">
-            <a:avLst/>
-          </a:prstGeom>
-          <a:ln w="28575">
-            <a:tailEnd type="arrow"/>
-          </a:ln>
-        </p:spPr>
-        <p:style>
-          <a:lnRef idx="1">
-            <a:schemeClr val="accent1"/>
-          </a:lnRef>
-          <a:fillRef idx="0">
-            <a:schemeClr val="accent1"/>
-          </a:fillRef>
-          <a:effectRef idx="0">
-            <a:schemeClr val="accent1"/>
-          </a:effectRef>
-          <a:fontRef idx="minor">
-            <a:schemeClr val="tx1"/>
-          </a:fontRef>
-        </p:style>
-      </p:cxnSp>
-      <p:sp>
-        <p:nvSpPr>
-          <p:cNvPr id="41" name="圆角矩形 16"/>
-          <p:cNvSpPr/>
-          <p:nvPr/>
-        </p:nvSpPr>
-        <p:spPr>
-          <a:xfrm>
-            <a:off x="649605" y="1584325"/>
-            <a:ext cx="8640000" cy="1080000"/>
-          </a:xfrm>
-          <a:prstGeom prst="roundRect">
-            <a:avLst/>
-          </a:prstGeom>
-        </p:spPr>
-        <p:style>
-          <a:lnRef idx="1">
-            <a:schemeClr val="accent1"/>
-          </a:lnRef>
-          <a:fillRef idx="2">
-            <a:schemeClr val="accent1"/>
-          </a:fillRef>
-          <a:effectRef idx="1">
-            <a:schemeClr val="accent1"/>
-          </a:effectRef>
-          <a:fontRef idx="minor">
-            <a:schemeClr val="dk1"/>
-          </a:fontRef>
-        </p:style>
-        <p:txBody>
-          <a:bodyPr lIns="174083" tIns="87041" rIns="174083" bIns="87041" rtlCol="0" anchor="ctr"/>
-          <a:p>
-            <a:pPr algn="ctr"/>
-            <a:r>
-              <a:rPr sz="2400" dirty="0" smtClean="0">
-                <a:solidFill>
-                  <a:schemeClr val="bg1"/>
-                </a:solidFill>
-                <a:sym typeface="+mn-ea"/>
-              </a:rPr>
-              <a:t>Determine whether to set the node and child nodes of the listener according to Depth</a:t>
-            </a:r>
-            <a:endParaRPr sz="2400" dirty="0" smtClean="0">
-              <a:solidFill>
-                <a:schemeClr val="bg1"/>
-              </a:solidFill>
-              <a:sym typeface="+mn-ea"/>
-            </a:endParaRPr>
-          </a:p>
-        </p:txBody>
-      </p:sp>
-      <p:sp>
-        <p:nvSpPr>
-          <p:cNvPr id="42" name="圆角矩形 17"/>
-          <p:cNvSpPr/>
-          <p:nvPr/>
-        </p:nvSpPr>
-        <p:spPr>
-          <a:xfrm>
-            <a:off x="649605" y="3569835"/>
-            <a:ext cx="8640000" cy="1080000"/>
-          </a:xfrm>
-          <a:prstGeom prst="roundRect">
-            <a:avLst/>
-          </a:prstGeom>
-        </p:spPr>
-        <p:style>
-          <a:lnRef idx="1">
-            <a:schemeClr val="accent1"/>
-          </a:lnRef>
-          <a:fillRef idx="2">
-            <a:schemeClr val="accent1"/>
-          </a:fillRef>
-          <a:effectRef idx="1">
-            <a:schemeClr val="accent1"/>
-          </a:effectRef>
-          <a:fontRef idx="minor">
-            <a:schemeClr val="dk1"/>
-          </a:fontRef>
-        </p:style>
-        <p:txBody>
-          <a:bodyPr lIns="174083" tIns="87041" rIns="174083" bIns="87041" rtlCol="0" anchor="ctr"/>
-          <a:p>
-            <a:pPr algn="ctr"/>
-            <a:r>
-              <a:rPr sz="2400" smtClean="0">
-                <a:solidFill>
-                  <a:schemeClr val="bg1"/>
-                </a:solidFill>
-              </a:rPr>
-              <a:t>Add node listeners for Depth level nodes through checkExists</a:t>
-            </a:r>
-            <a:endParaRPr sz="2400" smtClean="0">
-              <a:solidFill>
-                <a:schemeClr val="bg1"/>
-              </a:solidFill>
-            </a:endParaRPr>
-          </a:p>
-        </p:txBody>
-      </p:sp>
-      <p:sp>
-        <p:nvSpPr>
-          <p:cNvPr id="43" name="圆角矩形 18"/>
-          <p:cNvSpPr/>
-          <p:nvPr/>
-        </p:nvSpPr>
-        <p:spPr>
-          <a:xfrm>
-            <a:off x="649605" y="5554845"/>
-            <a:ext cx="8640000" cy="1080000"/>
-          </a:xfrm>
-          <a:prstGeom prst="roundRect">
-            <a:avLst/>
-          </a:prstGeom>
-        </p:spPr>
-        <p:style>
-          <a:lnRef idx="1">
-            <a:schemeClr val="accent1"/>
-          </a:lnRef>
-          <a:fillRef idx="2">
-            <a:schemeClr val="accent1"/>
-          </a:fillRef>
-          <a:effectRef idx="1">
-            <a:schemeClr val="accent1"/>
-          </a:effectRef>
-          <a:fontRef idx="minor">
-            <a:schemeClr val="dk1"/>
-          </a:fontRef>
-        </p:style>
-        <p:txBody>
-          <a:bodyPr lIns="174083" tIns="87041" rIns="174083" bIns="87041" rtlCol="0" anchor="ctr"/>
-          <a:p>
-            <a:pPr algn="ctr"/>
-            <a:r>
-              <a:rPr sz="2940" dirty="0" smtClean="0">
-                <a:solidFill>
-                  <a:schemeClr val="bg1"/>
-                </a:solidFill>
-              </a:rPr>
-              <a:t>Add node </a:t>
-            </a:r>
-            <a:r>
-              <a:rPr sz="2400" dirty="0" smtClean="0">
-                <a:solidFill>
-                  <a:schemeClr val="bg1"/>
-                </a:solidFill>
-              </a:rPr>
-              <a:t>listener </a:t>
-            </a:r>
-            <a:r>
-              <a:rPr sz="2940" dirty="0" smtClean="0">
-                <a:solidFill>
-                  <a:schemeClr val="bg1"/>
-                </a:solidFill>
-              </a:rPr>
-              <a:t>via getData</a:t>
-            </a:r>
-            <a:endParaRPr sz="2940" dirty="0" smtClean="0">
-              <a:solidFill>
-                <a:schemeClr val="bg1"/>
-              </a:solidFill>
-            </a:endParaRPr>
-          </a:p>
-        </p:txBody>
-      </p:sp>
-      <p:sp>
-        <p:nvSpPr>
-          <p:cNvPr id="49" name="圆角矩形 49"/>
-          <p:cNvSpPr/>
-          <p:nvPr/>
-        </p:nvSpPr>
-        <p:spPr>
-          <a:xfrm>
-            <a:off x="11014710" y="3569970"/>
-            <a:ext cx="8640000" cy="1080000"/>
-          </a:xfrm>
-          <a:prstGeom prst="roundRect">
-            <a:avLst/>
-          </a:prstGeom>
-        </p:spPr>
-        <p:style>
-          <a:lnRef idx="1">
-            <a:schemeClr val="accent1"/>
-          </a:lnRef>
-          <a:fillRef idx="2">
-            <a:schemeClr val="accent1"/>
-          </a:fillRef>
-          <a:effectRef idx="1">
-            <a:schemeClr val="accent1"/>
-          </a:effectRef>
-          <a:fontRef idx="minor">
-            <a:schemeClr val="dk1"/>
-          </a:fontRef>
-        </p:style>
-        <p:txBody>
-          <a:bodyPr lIns="174083" tIns="87041" rIns="174083" bIns="87041" rtlCol="0" anchor="ctr"/>
-          <a:p>
-            <a:pPr algn="ctr"/>
-            <a:r>
-              <a:rPr sz="2940" dirty="0" smtClean="0">
-                <a:solidFill>
-                  <a:schemeClr val="bg1"/>
-                </a:solidFill>
-              </a:rPr>
-              <a:t>The ZkServer node </a:t>
-            </a:r>
-            <a:r>
-              <a:rPr sz="2400" dirty="0" smtClean="0">
-                <a:solidFill>
-                  <a:schemeClr val="bg1"/>
-                </a:solidFill>
-              </a:rPr>
-              <a:t>changes</a:t>
-            </a:r>
-            <a:r>
-              <a:rPr sz="2940" dirty="0" smtClean="0">
-                <a:solidFill>
-                  <a:schemeClr val="bg1"/>
-                </a:solidFill>
-              </a:rPr>
-              <a:t>. Send a message</a:t>
-            </a:r>
-            <a:endParaRPr sz="2940" dirty="0" smtClean="0">
-              <a:solidFill>
-                <a:schemeClr val="bg1"/>
-              </a:solidFill>
-            </a:endParaRPr>
-          </a:p>
-        </p:txBody>
-      </p:sp>
-      <p:cxnSp>
-        <p:nvCxnSpPr>
-          <p:cNvPr id="2" name="直接箭头连接符 12"/>
-          <p:cNvCxnSpPr>
-            <a:stCxn id="41" idx="2"/>
-            <a:endCxn id="42" idx="0"/>
-          </p:cNvCxnSpPr>
-          <p:nvPr/>
-        </p:nvCxnSpPr>
-        <p:spPr>
-          <a:xfrm>
-            <a:off x="4969510" y="2664460"/>
-            <a:ext cx="0" cy="905510"/>
-          </a:xfrm>
-          <a:prstGeom prst="straightConnector1">
-            <a:avLst/>
-          </a:prstGeom>
-          <a:ln w="28575">
-            <a:tailEnd type="arrow"/>
-          </a:ln>
-        </p:spPr>
-        <p:style>
-          <a:lnRef idx="1">
-            <a:schemeClr val="accent1"/>
-          </a:lnRef>
-          <a:fillRef idx="0">
-            <a:schemeClr val="accent1"/>
-          </a:fillRef>
-          <a:effectRef idx="0">
-            <a:schemeClr val="accent1"/>
-          </a:effectRef>
-          <a:fontRef idx="minor">
-            <a:schemeClr val="tx1"/>
-          </a:fontRef>
-        </p:style>
-      </p:cxnSp>
-      <p:cxnSp>
-        <p:nvCxnSpPr>
-          <p:cNvPr id="7" name="直接箭头连接符 12"/>
-          <p:cNvCxnSpPr>
-            <a:stCxn id="42" idx="2"/>
-            <a:endCxn id="43" idx="0"/>
-          </p:cNvCxnSpPr>
-          <p:nvPr/>
-        </p:nvCxnSpPr>
-        <p:spPr>
-          <a:xfrm>
-            <a:off x="4969510" y="4650105"/>
-            <a:ext cx="0" cy="904875"/>
-          </a:xfrm>
-          <a:prstGeom prst="straightConnector1">
-            <a:avLst/>
-          </a:prstGeom>
-          <a:ln w="28575">
-            <a:tailEnd type="arrow"/>
-          </a:ln>
-        </p:spPr>
-        <p:style>
-          <a:lnRef idx="1">
-            <a:schemeClr val="accent1"/>
-          </a:lnRef>
-          <a:fillRef idx="0">
-            <a:schemeClr val="accent1"/>
-          </a:fillRef>
-          <a:effectRef idx="0">
-            <a:schemeClr val="accent1"/>
-          </a:effectRef>
-          <a:fontRef idx="minor">
-            <a:schemeClr val="tx1"/>
-          </a:fontRef>
-        </p:style>
-      </p:cxnSp>
-      <p:cxnSp>
-        <p:nvCxnSpPr>
-          <p:cNvPr id="8" name="直接箭头连接符 12"/>
-          <p:cNvCxnSpPr>
-            <a:stCxn id="43" idx="2"/>
-            <a:endCxn id="36" idx="0"/>
-          </p:cNvCxnSpPr>
-          <p:nvPr/>
-        </p:nvCxnSpPr>
-        <p:spPr>
-          <a:xfrm>
-            <a:off x="4969510" y="6635115"/>
-            <a:ext cx="0" cy="904875"/>
-          </a:xfrm>
-          <a:prstGeom prst="straightConnector1">
-            <a:avLst/>
-          </a:prstGeom>
-          <a:ln w="28575">
-            <a:tailEnd type="arrow"/>
-          </a:ln>
-        </p:spPr>
-        <p:style>
-          <a:lnRef idx="1">
-            <a:schemeClr val="accent1"/>
-          </a:lnRef>
-          <a:fillRef idx="0">
-            <a:schemeClr val="accent1"/>
-          </a:fillRef>
-          <a:effectRef idx="0">
-            <a:schemeClr val="accent1"/>
-          </a:effectRef>
-          <a:fontRef idx="minor">
-            <a:schemeClr val="tx1"/>
-          </a:fontRef>
-        </p:style>
-      </p:cxnSp>
-      <p:cxnSp>
-        <p:nvCxnSpPr>
-          <p:cNvPr id="9" name="直接箭头连接符 12"/>
-          <p:cNvCxnSpPr>
-            <a:stCxn id="35" idx="1"/>
-            <a:endCxn id="42" idx="1"/>
-          </p:cNvCxnSpPr>
-          <p:nvPr/>
-        </p:nvCxnSpPr>
-        <p:spPr>
-          <a:xfrm rot="10800000">
-            <a:off x="649605" y="4110355"/>
-            <a:ext cx="3175" cy="5955030"/>
-          </a:xfrm>
-          <a:prstGeom prst="bentConnector3">
-            <a:avLst>
-              <a:gd name="adj1" fmla="val 7600000"/>
-            </a:avLst>
-          </a:prstGeom>
-          <a:ln w="28575">
-            <a:tailEnd type="arrow"/>
-          </a:ln>
-        </p:spPr>
-        <p:style>
-          <a:lnRef idx="1">
-            <a:schemeClr val="accent1"/>
-          </a:lnRef>
-          <a:fillRef idx="0">
-            <a:schemeClr val="accent1"/>
-          </a:fillRef>
-          <a:effectRef idx="0">
-            <a:schemeClr val="accent1"/>
-          </a:effectRef>
-          <a:fontRef idx="minor">
-            <a:schemeClr val="tx1"/>
-          </a:fontRef>
-        </p:style>
-      </p:cxnSp>
-      <p:cxnSp>
-        <p:nvCxnSpPr>
-          <p:cNvPr id="10" name="直接箭头连接符 12"/>
-          <p:cNvCxnSpPr>
-            <a:stCxn id="49" idx="2"/>
-            <a:endCxn id="37" idx="0"/>
-          </p:cNvCxnSpPr>
-          <p:nvPr/>
-        </p:nvCxnSpPr>
-        <p:spPr>
-          <a:xfrm>
-            <a:off x="15334615" y="4650105"/>
-            <a:ext cx="0" cy="1436370"/>
-          </a:xfrm>
-          <a:prstGeom prst="straightConnector1">
-            <a:avLst/>
-          </a:prstGeom>
-          <a:ln w="28575">
-            <a:tailEnd type="arrow"/>
-          </a:ln>
-        </p:spPr>
-        <p:style>
-          <a:lnRef idx="1">
-            <a:schemeClr val="accent1"/>
-          </a:lnRef>
-          <a:fillRef idx="0">
-            <a:schemeClr val="accent1"/>
-          </a:fillRef>
-          <a:effectRef idx="0">
-            <a:schemeClr val="accent1"/>
-          </a:effectRef>
-          <a:fontRef idx="minor">
-            <a:schemeClr val="tx1"/>
-          </a:fontRef>
-        </p:style>
-      </p:cxnSp>
-      <p:cxnSp>
-        <p:nvCxnSpPr>
-          <p:cNvPr id="12" name="直接箭头连接符 12"/>
-          <p:cNvCxnSpPr>
-            <a:stCxn id="36" idx="3"/>
-            <a:endCxn id="49" idx="1"/>
-          </p:cNvCxnSpPr>
-          <p:nvPr/>
-        </p:nvCxnSpPr>
-        <p:spPr>
-          <a:xfrm flipV="1">
-            <a:off x="9289415" y="4110355"/>
-            <a:ext cx="1725295" cy="3970020"/>
-          </a:xfrm>
-          <a:prstGeom prst="bentConnector3">
-            <a:avLst>
-              <a:gd name="adj1" fmla="val 50018"/>
-            </a:avLst>
-          </a:prstGeom>
-          <a:ln w="12700" cmpd="sng">
-            <a:solidFill>
-              <a:schemeClr val="accent1">
-                <a:shade val="50000"/>
-              </a:schemeClr>
-            </a:solidFill>
-            <a:prstDash val="sysDot"/>
-            <a:tailEnd type="arrow"/>
-          </a:ln>
-        </p:spPr>
-        <p:style>
-          <a:lnRef idx="1">
-            <a:schemeClr val="accent1"/>
-          </a:lnRef>
-          <a:fillRef idx="0">
-            <a:schemeClr val="accent1"/>
-          </a:fillRef>
-          <a:effectRef idx="0">
-            <a:schemeClr val="accent1"/>
-          </a:effectRef>
-          <a:fontRef idx="minor">
-            <a:schemeClr val="tx1"/>
-          </a:fontRef>
-        </p:style>
-      </p:cxnSp>
-      <p:cxnSp>
-        <p:nvCxnSpPr>
-          <p:cNvPr id="13" name="直接箭头连接符 12"/>
-          <p:cNvCxnSpPr>
-            <a:stCxn id="43" idx="3"/>
-            <a:endCxn id="49" idx="1"/>
-          </p:cNvCxnSpPr>
-          <p:nvPr/>
-        </p:nvCxnSpPr>
-        <p:spPr>
-          <a:xfrm flipV="1">
-            <a:off x="9289415" y="4110355"/>
-            <a:ext cx="1725295" cy="1985010"/>
-          </a:xfrm>
-          <a:prstGeom prst="bentConnector3">
-            <a:avLst>
-              <a:gd name="adj1" fmla="val 50018"/>
-            </a:avLst>
-          </a:prstGeom>
-          <a:ln w="12700" cmpd="sng">
-            <a:solidFill>
-              <a:schemeClr val="accent1">
-                <a:shade val="50000"/>
-              </a:schemeClr>
-            </a:solidFill>
-            <a:prstDash val="sysDot"/>
-            <a:tailEnd type="arrow"/>
-          </a:ln>
-        </p:spPr>
-        <p:style>
-          <a:lnRef idx="1">
-            <a:schemeClr val="accent1"/>
-          </a:lnRef>
-          <a:fillRef idx="0">
-            <a:schemeClr val="accent1"/>
-          </a:fillRef>
-          <a:effectRef idx="0">
-            <a:schemeClr val="accent1"/>
-          </a:effectRef>
-          <a:fontRef idx="minor">
-            <a:schemeClr val="tx1"/>
-          </a:fontRef>
-        </p:style>
-      </p:cxnSp>
-      <p:cxnSp>
-        <p:nvCxnSpPr>
-          <p:cNvPr id="14" name="直接箭头连接符 12"/>
-          <p:cNvCxnSpPr>
-            <a:stCxn id="42" idx="3"/>
-            <a:endCxn id="49" idx="1"/>
-          </p:cNvCxnSpPr>
-          <p:nvPr/>
-        </p:nvCxnSpPr>
-        <p:spPr>
-          <a:xfrm>
-            <a:off x="9289415" y="4110355"/>
-            <a:ext cx="1725295" cy="3175"/>
-          </a:xfrm>
-          <a:prstGeom prst="bentConnector2">
-            <a:avLst/>
-          </a:prstGeom>
-          <a:ln w="12700" cmpd="sng">
-            <a:solidFill>
-              <a:schemeClr val="accent1">
-                <a:shade val="50000"/>
-              </a:schemeClr>
-            </a:solidFill>
-            <a:prstDash val="sysDot"/>
-            <a:tailEnd type="arrow"/>
-          </a:ln>
-        </p:spPr>
-        <p:style>
-          <a:lnRef idx="1">
-            <a:schemeClr val="accent1"/>
-          </a:lnRef>
-          <a:fillRef idx="0">
-            <a:schemeClr val="accent1"/>
-          </a:fillRef>
-          <a:effectRef idx="0">
-            <a:schemeClr val="accent1"/>
-          </a:effectRef>
-          <a:fontRef idx="minor">
-            <a:schemeClr val="tx1"/>
-          </a:fontRef>
-        </p:style>
-      </p:cxnSp>
-      <p:sp>
-        <p:nvSpPr>
-          <p:cNvPr id="54" name="TextBox 21"/>
-          <p:cNvSpPr txBox="1"/>
-          <p:nvPr/>
-        </p:nvSpPr>
-        <p:spPr>
-          <a:xfrm>
-            <a:off x="9260908" y="3620551"/>
-            <a:ext cx="1827530" cy="395605"/>
+            <a:off x="1644015" y="1795145"/>
+            <a:ext cx="17221200" cy="7205345"/>
           </a:xfrm>
           <a:prstGeom prst="rect">
             <a:avLst/>
           </a:prstGeom>
           <a:noFill/>
+          <a:ln w="9525">
+            <a:noFill/>
+            <a:miter lim="800000"/>
+            <a:headEnd/>
+            <a:tailEnd/>
+          </a:ln>
+          <a:effectLst/>
         </p:spPr>
-        <p:txBody>
-          <a:bodyPr wrap="none" rtlCol="0">
-            <a:spAutoFit/>
-          </a:bodyPr>
-          <a:p>
-            <a:pPr algn="l"/>
-            <a:r>
-              <a:rPr lang="zh-CN" altLang="en-US" sz="1800" dirty="0" smtClean="0">
-                <a:solidFill>
-                  <a:schemeClr val="bg1"/>
-                </a:solidFill>
-              </a:rPr>
-              <a:t>node changes</a:t>
-            </a:r>
-            <a:endParaRPr lang="zh-CN" altLang="en-US" sz="1800" dirty="0" smtClean="0">
-              <a:solidFill>
-                <a:schemeClr val="bg1"/>
-              </a:solidFill>
-            </a:endParaRPr>
-          </a:p>
-        </p:txBody>
-      </p:sp>
+      </p:pic>
     </p:spTree>
   </p:cSld>
   <p:clrMapOvr>
@@ -40364,6 +39760,915 @@
 </file>
 
 <file path=ppt/slides/slide40.xml><?xml version="1.0" encoding="utf-8"?>
+<p:sld xmlns:a="http://schemas.openxmlformats.org/drawingml/2006/main" xmlns:r="http://schemas.openxmlformats.org/officeDocument/2006/relationships" xmlns:p="http://schemas.openxmlformats.org/presentationml/2006/main" show="0">
+  <p:cSld>
+    <p:bg>
+      <p:bgPr>
+        <a:solidFill>
+          <a:schemeClr val="bg1">
+            <a:lumMod val="10000"/>
+            <a:lumOff val="90000"/>
+          </a:schemeClr>
+        </a:solidFill>
+        <a:effectLst/>
+      </p:bgPr>
+    </p:bg>
+    <p:spTree>
+      <p:nvGrpSpPr>
+        <p:cNvPr id="1" name=""/>
+        <p:cNvGrpSpPr/>
+        <p:nvPr/>
+      </p:nvGrpSpPr>
+      <p:grpSpPr>
+        <a:xfrm>
+          <a:off x="0" y="0"/>
+          <a:ext cx="0" cy="0"/>
+          <a:chOff x="0" y="0"/>
+          <a:chExt cx="0" cy="0"/>
+        </a:xfrm>
+      </p:grpSpPr>
+      <p:grpSp>
+        <p:nvGrpSpPr>
+          <p:cNvPr id="3" name="Group 2"/>
+          <p:cNvGrpSpPr/>
+          <p:nvPr/>
+        </p:nvGrpSpPr>
+        <p:grpSpPr>
+          <a:xfrm>
+            <a:off x="649605" y="130175"/>
+            <a:ext cx="19004915" cy="10474325"/>
+            <a:chOff x="1023" y="205"/>
+            <a:chExt cx="29929" cy="16495"/>
+          </a:xfrm>
+        </p:grpSpPr>
+        <p:sp>
+          <p:nvSpPr>
+            <p:cNvPr id="33" name="流程图: 联系 6"/>
+            <p:cNvSpPr/>
+            <p:nvPr/>
+          </p:nvSpPr>
+          <p:spPr>
+            <a:xfrm>
+              <a:off x="14512" y="205"/>
+              <a:ext cx="2835" cy="2835"/>
+            </a:xfrm>
+            <a:prstGeom prst="flowChartConnector">
+              <a:avLst/>
+            </a:prstGeom>
+          </p:spPr>
+          <p:style>
+            <a:lnRef idx="1">
+              <a:schemeClr val="accent1"/>
+            </a:lnRef>
+            <a:fillRef idx="2">
+              <a:schemeClr val="accent1"/>
+            </a:fillRef>
+            <a:effectRef idx="1">
+              <a:schemeClr val="accent1"/>
+            </a:effectRef>
+            <a:fontRef idx="minor">
+              <a:schemeClr val="dk1"/>
+            </a:fontRef>
+          </p:style>
+          <p:txBody>
+            <a:bodyPr lIns="174083" tIns="87041" rIns="174083" bIns="87041" rtlCol="0" anchor="ctr"/>
+            <a:p>
+              <a:pPr algn="ctr"/>
+              <a:r>
+                <a:rPr lang="en-US" altLang="zh-CN" dirty="0">
+                  <a:solidFill>
+                    <a:schemeClr val="bg1"/>
+                  </a:solidFill>
+                  <a:sym typeface="+mn-ea"/>
+                </a:rPr>
+                <a:t>StartUp</a:t>
+              </a:r>
+              <a:endParaRPr lang="en-US" altLang="zh-CN" dirty="0">
+                <a:solidFill>
+                  <a:schemeClr val="bg1"/>
+                </a:solidFill>
+                <a:sym typeface="+mn-ea"/>
+              </a:endParaRPr>
+            </a:p>
+          </p:txBody>
+        </p:sp>
+        <p:sp>
+          <p:nvSpPr>
+            <p:cNvPr id="35" name="圆角矩形 8"/>
+            <p:cNvSpPr/>
+            <p:nvPr/>
+          </p:nvSpPr>
+          <p:spPr>
+            <a:xfrm>
+              <a:off x="1023" y="15000"/>
+              <a:ext cx="13606" cy="1701"/>
+            </a:xfrm>
+            <a:prstGeom prst="roundRect">
+              <a:avLst/>
+            </a:prstGeom>
+          </p:spPr>
+          <p:style>
+            <a:lnRef idx="1">
+              <a:schemeClr val="accent1"/>
+            </a:lnRef>
+            <a:fillRef idx="2">
+              <a:schemeClr val="accent1"/>
+            </a:fillRef>
+            <a:effectRef idx="1">
+              <a:schemeClr val="accent1"/>
+            </a:effectRef>
+            <a:fontRef idx="minor">
+              <a:schemeClr val="dk1"/>
+            </a:fontRef>
+          </p:style>
+          <p:txBody>
+            <a:bodyPr lIns="174083" tIns="87041" rIns="174083" bIns="87041" rtlCol="0" anchor="ctr"/>
+            <a:p>
+              <a:pPr algn="ctr"/>
+              <a:r>
+                <a:rPr sz="2400">
+                  <a:solidFill>
+                    <a:schemeClr val="bg1"/>
+                  </a:solidFill>
+                </a:rPr>
+                <a:t>Call back the registered TreeCacheListener</a:t>
+              </a:r>
+              <a:endParaRPr sz="2400">
+                <a:solidFill>
+                  <a:schemeClr val="bg1"/>
+                </a:solidFill>
+              </a:endParaRPr>
+            </a:p>
+          </p:txBody>
+        </p:sp>
+        <p:sp>
+          <p:nvSpPr>
+            <p:cNvPr id="36" name="圆角矩形 9"/>
+            <p:cNvSpPr/>
+            <p:nvPr/>
+          </p:nvSpPr>
+          <p:spPr>
+            <a:xfrm>
+              <a:off x="1023" y="11874"/>
+              <a:ext cx="13606" cy="1701"/>
+            </a:xfrm>
+            <a:prstGeom prst="roundRect">
+              <a:avLst/>
+            </a:prstGeom>
+          </p:spPr>
+          <p:style>
+            <a:lnRef idx="1">
+              <a:schemeClr val="accent1"/>
+            </a:lnRef>
+            <a:fillRef idx="2">
+              <a:schemeClr val="accent1"/>
+            </a:fillRef>
+            <a:effectRef idx="1">
+              <a:schemeClr val="accent1"/>
+            </a:effectRef>
+            <a:fontRef idx="minor">
+              <a:schemeClr val="dk1"/>
+            </a:fontRef>
+          </p:style>
+          <p:txBody>
+            <a:bodyPr lIns="174083" tIns="87041" rIns="174083" bIns="87041" rtlCol="0" anchor="ctr"/>
+            <a:p>
+              <a:pPr algn="ctr"/>
+              <a:r>
+                <a:rPr sz="2400" dirty="0" smtClean="0">
+                  <a:solidFill>
+                    <a:schemeClr val="bg1"/>
+                  </a:solidFill>
+                </a:rPr>
+                <a:t>Add child node listeners via getChildren</a:t>
+              </a:r>
+              <a:endParaRPr sz="2400" dirty="0" smtClean="0">
+                <a:solidFill>
+                  <a:schemeClr val="bg1"/>
+                </a:solidFill>
+              </a:endParaRPr>
+            </a:p>
+          </p:txBody>
+        </p:sp>
+        <p:sp>
+          <p:nvSpPr>
+            <p:cNvPr id="37" name="圆角矩形 10"/>
+            <p:cNvSpPr/>
+            <p:nvPr/>
+          </p:nvSpPr>
+          <p:spPr>
+            <a:xfrm>
+              <a:off x="17346" y="9585"/>
+              <a:ext cx="13606" cy="1701"/>
+            </a:xfrm>
+            <a:prstGeom prst="roundRect">
+              <a:avLst/>
+            </a:prstGeom>
+          </p:spPr>
+          <p:style>
+            <a:lnRef idx="1">
+              <a:schemeClr val="accent1"/>
+            </a:lnRef>
+            <a:fillRef idx="2">
+              <a:schemeClr val="accent1"/>
+            </a:fillRef>
+            <a:effectRef idx="1">
+              <a:schemeClr val="accent1"/>
+            </a:effectRef>
+            <a:fontRef idx="minor">
+              <a:schemeClr val="dk1"/>
+            </a:fontRef>
+          </p:style>
+          <p:txBody>
+            <a:bodyPr lIns="174083" tIns="87041" rIns="174083" bIns="87041" rtlCol="0" anchor="ctr"/>
+            <a:p>
+              <a:pPr algn="ctr"/>
+              <a:r>
+                <a:rPr sz="2400" dirty="0" smtClean="0">
+                  <a:solidFill>
+                    <a:schemeClr val="bg1"/>
+                  </a:solidFill>
+                </a:rPr>
+                <a:t>Receive events from ZkServer</a:t>
+              </a:r>
+              <a:endParaRPr sz="2400" dirty="0" smtClean="0">
+                <a:solidFill>
+                  <a:schemeClr val="bg1"/>
+                </a:solidFill>
+              </a:endParaRPr>
+            </a:p>
+          </p:txBody>
+        </p:sp>
+        <p:cxnSp>
+          <p:nvCxnSpPr>
+            <p:cNvPr id="39" name="直接箭头连接符 12"/>
+            <p:cNvCxnSpPr>
+              <a:stCxn id="33" idx="2"/>
+              <a:endCxn id="41" idx="0"/>
+            </p:cNvCxnSpPr>
+            <p:nvPr/>
+          </p:nvCxnSpPr>
+          <p:spPr>
+            <a:xfrm rot="10800000" flipV="1">
+              <a:off x="7826" y="1623"/>
+              <a:ext cx="6686" cy="872"/>
+            </a:xfrm>
+            <a:prstGeom prst="bentConnector2">
+              <a:avLst/>
+            </a:prstGeom>
+            <a:ln w="28575">
+              <a:tailEnd type="arrow"/>
+            </a:ln>
+          </p:spPr>
+          <p:style>
+            <a:lnRef idx="1">
+              <a:schemeClr val="accent1"/>
+            </a:lnRef>
+            <a:fillRef idx="0">
+              <a:schemeClr val="accent1"/>
+            </a:fillRef>
+            <a:effectRef idx="0">
+              <a:schemeClr val="accent1"/>
+            </a:effectRef>
+            <a:fontRef idx="minor">
+              <a:schemeClr val="tx1"/>
+            </a:fontRef>
+          </p:style>
+        </p:cxnSp>
+        <p:cxnSp>
+          <p:nvCxnSpPr>
+            <p:cNvPr id="40" name="直接箭头连接符 65"/>
+            <p:cNvCxnSpPr>
+              <a:stCxn id="37" idx="2"/>
+              <a:endCxn id="35" idx="3"/>
+            </p:cNvCxnSpPr>
+            <p:nvPr/>
+          </p:nvCxnSpPr>
+          <p:spPr>
+            <a:xfrm rot="5400000">
+              <a:off x="17107" y="8809"/>
+              <a:ext cx="4565" cy="9520"/>
+            </a:xfrm>
+            <a:prstGeom prst="bentConnector2">
+              <a:avLst/>
+            </a:prstGeom>
+            <a:ln w="28575">
+              <a:tailEnd type="arrow"/>
+            </a:ln>
+          </p:spPr>
+          <p:style>
+            <a:lnRef idx="1">
+              <a:schemeClr val="accent1"/>
+            </a:lnRef>
+            <a:fillRef idx="0">
+              <a:schemeClr val="accent1"/>
+            </a:fillRef>
+            <a:effectRef idx="0">
+              <a:schemeClr val="accent1"/>
+            </a:effectRef>
+            <a:fontRef idx="minor">
+              <a:schemeClr val="tx1"/>
+            </a:fontRef>
+          </p:style>
+        </p:cxnSp>
+        <p:sp>
+          <p:nvSpPr>
+            <p:cNvPr id="41" name="圆角矩形 16"/>
+            <p:cNvSpPr/>
+            <p:nvPr/>
+          </p:nvSpPr>
+          <p:spPr>
+            <a:xfrm>
+              <a:off x="1023" y="2495"/>
+              <a:ext cx="13606" cy="1701"/>
+            </a:xfrm>
+            <a:prstGeom prst="roundRect">
+              <a:avLst/>
+            </a:prstGeom>
+          </p:spPr>
+          <p:style>
+            <a:lnRef idx="1">
+              <a:schemeClr val="accent1"/>
+            </a:lnRef>
+            <a:fillRef idx="2">
+              <a:schemeClr val="accent1"/>
+            </a:fillRef>
+            <a:effectRef idx="1">
+              <a:schemeClr val="accent1"/>
+            </a:effectRef>
+            <a:fontRef idx="minor">
+              <a:schemeClr val="dk1"/>
+            </a:fontRef>
+          </p:style>
+          <p:txBody>
+            <a:bodyPr lIns="174083" tIns="87041" rIns="174083" bIns="87041" rtlCol="0" anchor="ctr"/>
+            <a:p>
+              <a:pPr algn="ctr"/>
+              <a:r>
+                <a:rPr sz="2400" dirty="0" smtClean="0">
+                  <a:solidFill>
+                    <a:schemeClr val="bg1"/>
+                  </a:solidFill>
+                  <a:sym typeface="+mn-ea"/>
+                </a:rPr>
+                <a:t>Determine whether to set the node and child nodes of the listener according to Depth</a:t>
+              </a:r>
+              <a:endParaRPr sz="2400" dirty="0" smtClean="0">
+                <a:solidFill>
+                  <a:schemeClr val="bg1"/>
+                </a:solidFill>
+                <a:sym typeface="+mn-ea"/>
+              </a:endParaRPr>
+            </a:p>
+          </p:txBody>
+        </p:sp>
+        <p:sp>
+          <p:nvSpPr>
+            <p:cNvPr id="42" name="圆角矩形 17"/>
+            <p:cNvSpPr/>
+            <p:nvPr/>
+          </p:nvSpPr>
+          <p:spPr>
+            <a:xfrm>
+              <a:off x="1023" y="5622"/>
+              <a:ext cx="13606" cy="1701"/>
+            </a:xfrm>
+            <a:prstGeom prst="roundRect">
+              <a:avLst/>
+            </a:prstGeom>
+          </p:spPr>
+          <p:style>
+            <a:lnRef idx="1">
+              <a:schemeClr val="accent1"/>
+            </a:lnRef>
+            <a:fillRef idx="2">
+              <a:schemeClr val="accent1"/>
+            </a:fillRef>
+            <a:effectRef idx="1">
+              <a:schemeClr val="accent1"/>
+            </a:effectRef>
+            <a:fontRef idx="minor">
+              <a:schemeClr val="dk1"/>
+            </a:fontRef>
+          </p:style>
+          <p:txBody>
+            <a:bodyPr lIns="174083" tIns="87041" rIns="174083" bIns="87041" rtlCol="0" anchor="ctr"/>
+            <a:p>
+              <a:pPr algn="ctr"/>
+              <a:r>
+                <a:rPr sz="2400" smtClean="0">
+                  <a:solidFill>
+                    <a:schemeClr val="bg1"/>
+                  </a:solidFill>
+                </a:rPr>
+                <a:t>Add node listeners for Depth level nodes through checkExists</a:t>
+              </a:r>
+              <a:endParaRPr sz="2400" smtClean="0">
+                <a:solidFill>
+                  <a:schemeClr val="bg1"/>
+                </a:solidFill>
+              </a:endParaRPr>
+            </a:p>
+          </p:txBody>
+        </p:sp>
+        <p:sp>
+          <p:nvSpPr>
+            <p:cNvPr id="43" name="圆角矩形 18"/>
+            <p:cNvSpPr/>
+            <p:nvPr/>
+          </p:nvSpPr>
+          <p:spPr>
+            <a:xfrm>
+              <a:off x="1023" y="8748"/>
+              <a:ext cx="13606" cy="1701"/>
+            </a:xfrm>
+            <a:prstGeom prst="roundRect">
+              <a:avLst/>
+            </a:prstGeom>
+          </p:spPr>
+          <p:style>
+            <a:lnRef idx="1">
+              <a:schemeClr val="accent1"/>
+            </a:lnRef>
+            <a:fillRef idx="2">
+              <a:schemeClr val="accent1"/>
+            </a:fillRef>
+            <a:effectRef idx="1">
+              <a:schemeClr val="accent1"/>
+            </a:effectRef>
+            <a:fontRef idx="minor">
+              <a:schemeClr val="dk1"/>
+            </a:fontRef>
+          </p:style>
+          <p:txBody>
+            <a:bodyPr lIns="174083" tIns="87041" rIns="174083" bIns="87041" rtlCol="0" anchor="ctr"/>
+            <a:p>
+              <a:pPr algn="ctr"/>
+              <a:r>
+                <a:rPr sz="2940" dirty="0" smtClean="0">
+                  <a:solidFill>
+                    <a:schemeClr val="bg1"/>
+                  </a:solidFill>
+                </a:rPr>
+                <a:t>Add node </a:t>
+              </a:r>
+              <a:r>
+                <a:rPr sz="2400" dirty="0" smtClean="0">
+                  <a:solidFill>
+                    <a:schemeClr val="bg1"/>
+                  </a:solidFill>
+                </a:rPr>
+                <a:t>listener </a:t>
+              </a:r>
+              <a:r>
+                <a:rPr sz="2940" dirty="0" smtClean="0">
+                  <a:solidFill>
+                    <a:schemeClr val="bg1"/>
+                  </a:solidFill>
+                </a:rPr>
+                <a:t>via getData</a:t>
+              </a:r>
+              <a:endParaRPr sz="2940" dirty="0" smtClean="0">
+                <a:solidFill>
+                  <a:schemeClr val="bg1"/>
+                </a:solidFill>
+              </a:endParaRPr>
+            </a:p>
+          </p:txBody>
+        </p:sp>
+        <p:sp>
+          <p:nvSpPr>
+            <p:cNvPr id="49" name="圆角矩形 49"/>
+            <p:cNvSpPr/>
+            <p:nvPr/>
+          </p:nvSpPr>
+          <p:spPr>
+            <a:xfrm>
+              <a:off x="17346" y="5622"/>
+              <a:ext cx="13606" cy="1701"/>
+            </a:xfrm>
+            <a:prstGeom prst="roundRect">
+              <a:avLst/>
+            </a:prstGeom>
+          </p:spPr>
+          <p:style>
+            <a:lnRef idx="1">
+              <a:schemeClr val="accent1"/>
+            </a:lnRef>
+            <a:fillRef idx="2">
+              <a:schemeClr val="accent1"/>
+            </a:fillRef>
+            <a:effectRef idx="1">
+              <a:schemeClr val="accent1"/>
+            </a:effectRef>
+            <a:fontRef idx="minor">
+              <a:schemeClr val="dk1"/>
+            </a:fontRef>
+          </p:style>
+          <p:txBody>
+            <a:bodyPr lIns="174083" tIns="87041" rIns="174083" bIns="87041" rtlCol="0" anchor="ctr"/>
+            <a:p>
+              <a:pPr algn="ctr"/>
+              <a:r>
+                <a:rPr sz="2940" dirty="0" smtClean="0">
+                  <a:solidFill>
+                    <a:schemeClr val="bg1"/>
+                  </a:solidFill>
+                </a:rPr>
+                <a:t>The ZkServer node </a:t>
+              </a:r>
+              <a:r>
+                <a:rPr sz="2400" dirty="0" smtClean="0">
+                  <a:solidFill>
+                    <a:schemeClr val="bg1"/>
+                  </a:solidFill>
+                </a:rPr>
+                <a:t>changes</a:t>
+              </a:r>
+              <a:r>
+                <a:rPr sz="2940" dirty="0" smtClean="0">
+                  <a:solidFill>
+                    <a:schemeClr val="bg1"/>
+                  </a:solidFill>
+                </a:rPr>
+                <a:t>. Send a message</a:t>
+              </a:r>
+              <a:endParaRPr sz="2940" dirty="0" smtClean="0">
+                <a:solidFill>
+                  <a:schemeClr val="bg1"/>
+                </a:solidFill>
+              </a:endParaRPr>
+            </a:p>
+          </p:txBody>
+        </p:sp>
+        <p:cxnSp>
+          <p:nvCxnSpPr>
+            <p:cNvPr id="2" name="直接箭头连接符 12"/>
+            <p:cNvCxnSpPr>
+              <a:stCxn id="41" idx="2"/>
+              <a:endCxn id="42" idx="0"/>
+            </p:cNvCxnSpPr>
+            <p:nvPr/>
+          </p:nvCxnSpPr>
+          <p:spPr>
+            <a:xfrm>
+              <a:off x="7826" y="4196"/>
+              <a:ext cx="0" cy="1426"/>
+            </a:xfrm>
+            <a:prstGeom prst="straightConnector1">
+              <a:avLst/>
+            </a:prstGeom>
+            <a:ln w="28575">
+              <a:tailEnd type="arrow"/>
+            </a:ln>
+          </p:spPr>
+          <p:style>
+            <a:lnRef idx="1">
+              <a:schemeClr val="accent1"/>
+            </a:lnRef>
+            <a:fillRef idx="0">
+              <a:schemeClr val="accent1"/>
+            </a:fillRef>
+            <a:effectRef idx="0">
+              <a:schemeClr val="accent1"/>
+            </a:effectRef>
+            <a:fontRef idx="minor">
+              <a:schemeClr val="tx1"/>
+            </a:fontRef>
+          </p:style>
+        </p:cxnSp>
+        <p:cxnSp>
+          <p:nvCxnSpPr>
+            <p:cNvPr id="7" name="直接箭头连接符 12"/>
+            <p:cNvCxnSpPr>
+              <a:stCxn id="42" idx="2"/>
+              <a:endCxn id="43" idx="0"/>
+            </p:cNvCxnSpPr>
+            <p:nvPr/>
+          </p:nvCxnSpPr>
+          <p:spPr>
+            <a:xfrm>
+              <a:off x="7826" y="7323"/>
+              <a:ext cx="0" cy="1425"/>
+            </a:xfrm>
+            <a:prstGeom prst="straightConnector1">
+              <a:avLst/>
+            </a:prstGeom>
+            <a:ln w="28575">
+              <a:tailEnd type="arrow"/>
+            </a:ln>
+          </p:spPr>
+          <p:style>
+            <a:lnRef idx="1">
+              <a:schemeClr val="accent1"/>
+            </a:lnRef>
+            <a:fillRef idx="0">
+              <a:schemeClr val="accent1"/>
+            </a:fillRef>
+            <a:effectRef idx="0">
+              <a:schemeClr val="accent1"/>
+            </a:effectRef>
+            <a:fontRef idx="minor">
+              <a:schemeClr val="tx1"/>
+            </a:fontRef>
+          </p:style>
+        </p:cxnSp>
+        <p:cxnSp>
+          <p:nvCxnSpPr>
+            <p:cNvPr id="8" name="直接箭头连接符 12"/>
+            <p:cNvCxnSpPr>
+              <a:stCxn id="43" idx="2"/>
+              <a:endCxn id="36" idx="0"/>
+            </p:cNvCxnSpPr>
+            <p:nvPr/>
+          </p:nvCxnSpPr>
+          <p:spPr>
+            <a:xfrm>
+              <a:off x="7826" y="10449"/>
+              <a:ext cx="0" cy="1425"/>
+            </a:xfrm>
+            <a:prstGeom prst="straightConnector1">
+              <a:avLst/>
+            </a:prstGeom>
+            <a:ln w="28575">
+              <a:tailEnd type="arrow"/>
+            </a:ln>
+          </p:spPr>
+          <p:style>
+            <a:lnRef idx="1">
+              <a:schemeClr val="accent1"/>
+            </a:lnRef>
+            <a:fillRef idx="0">
+              <a:schemeClr val="accent1"/>
+            </a:fillRef>
+            <a:effectRef idx="0">
+              <a:schemeClr val="accent1"/>
+            </a:effectRef>
+            <a:fontRef idx="minor">
+              <a:schemeClr val="tx1"/>
+            </a:fontRef>
+          </p:style>
+        </p:cxnSp>
+        <p:cxnSp>
+          <p:nvCxnSpPr>
+            <p:cNvPr id="9" name="直接箭头连接符 12"/>
+            <p:cNvCxnSpPr>
+              <a:stCxn id="35" idx="1"/>
+              <a:endCxn id="42" idx="1"/>
+            </p:cNvCxnSpPr>
+            <p:nvPr/>
+          </p:nvCxnSpPr>
+          <p:spPr>
+            <a:xfrm rot="10800000">
+              <a:off x="1023" y="6473"/>
+              <a:ext cx="5" cy="9378"/>
+            </a:xfrm>
+            <a:prstGeom prst="bentConnector3">
+              <a:avLst>
+                <a:gd name="adj1" fmla="val 7600000"/>
+              </a:avLst>
+            </a:prstGeom>
+            <a:ln w="28575">
+              <a:tailEnd type="arrow"/>
+            </a:ln>
+          </p:spPr>
+          <p:style>
+            <a:lnRef idx="1">
+              <a:schemeClr val="accent1"/>
+            </a:lnRef>
+            <a:fillRef idx="0">
+              <a:schemeClr val="accent1"/>
+            </a:fillRef>
+            <a:effectRef idx="0">
+              <a:schemeClr val="accent1"/>
+            </a:effectRef>
+            <a:fontRef idx="minor">
+              <a:schemeClr val="tx1"/>
+            </a:fontRef>
+          </p:style>
+        </p:cxnSp>
+        <p:cxnSp>
+          <p:nvCxnSpPr>
+            <p:cNvPr id="10" name="直接箭头连接符 12"/>
+            <p:cNvCxnSpPr>
+              <a:stCxn id="49" idx="2"/>
+              <a:endCxn id="37" idx="0"/>
+            </p:cNvCxnSpPr>
+            <p:nvPr/>
+          </p:nvCxnSpPr>
+          <p:spPr>
+            <a:xfrm>
+              <a:off x="24149" y="7323"/>
+              <a:ext cx="0" cy="2262"/>
+            </a:xfrm>
+            <a:prstGeom prst="straightConnector1">
+              <a:avLst/>
+            </a:prstGeom>
+            <a:ln w="28575">
+              <a:tailEnd type="arrow"/>
+            </a:ln>
+          </p:spPr>
+          <p:style>
+            <a:lnRef idx="1">
+              <a:schemeClr val="accent1"/>
+            </a:lnRef>
+            <a:fillRef idx="0">
+              <a:schemeClr val="accent1"/>
+            </a:fillRef>
+            <a:effectRef idx="0">
+              <a:schemeClr val="accent1"/>
+            </a:effectRef>
+            <a:fontRef idx="minor">
+              <a:schemeClr val="tx1"/>
+            </a:fontRef>
+          </p:style>
+        </p:cxnSp>
+        <p:cxnSp>
+          <p:nvCxnSpPr>
+            <p:cNvPr id="12" name="直接箭头连接符 12"/>
+            <p:cNvCxnSpPr>
+              <a:stCxn id="36" idx="3"/>
+              <a:endCxn id="49" idx="1"/>
+            </p:cNvCxnSpPr>
+            <p:nvPr/>
+          </p:nvCxnSpPr>
+          <p:spPr>
+            <a:xfrm flipV="1">
+              <a:off x="14629" y="6473"/>
+              <a:ext cx="2717" cy="6252"/>
+            </a:xfrm>
+            <a:prstGeom prst="bentConnector3">
+              <a:avLst>
+                <a:gd name="adj1" fmla="val 50018"/>
+              </a:avLst>
+            </a:prstGeom>
+            <a:ln w="12700" cmpd="sng">
+              <a:solidFill>
+                <a:schemeClr val="accent1">
+                  <a:shade val="50000"/>
+                </a:schemeClr>
+              </a:solidFill>
+              <a:prstDash val="sysDot"/>
+              <a:tailEnd type="arrow"/>
+            </a:ln>
+          </p:spPr>
+          <p:style>
+            <a:lnRef idx="1">
+              <a:schemeClr val="accent1"/>
+            </a:lnRef>
+            <a:fillRef idx="0">
+              <a:schemeClr val="accent1"/>
+            </a:fillRef>
+            <a:effectRef idx="0">
+              <a:schemeClr val="accent1"/>
+            </a:effectRef>
+            <a:fontRef idx="minor">
+              <a:schemeClr val="tx1"/>
+            </a:fontRef>
+          </p:style>
+        </p:cxnSp>
+        <p:cxnSp>
+          <p:nvCxnSpPr>
+            <p:cNvPr id="13" name="直接箭头连接符 12"/>
+            <p:cNvCxnSpPr>
+              <a:stCxn id="43" idx="3"/>
+              <a:endCxn id="49" idx="1"/>
+            </p:cNvCxnSpPr>
+            <p:nvPr/>
+          </p:nvCxnSpPr>
+          <p:spPr>
+            <a:xfrm flipV="1">
+              <a:off x="14629" y="6473"/>
+              <a:ext cx="2717" cy="3126"/>
+            </a:xfrm>
+            <a:prstGeom prst="bentConnector3">
+              <a:avLst>
+                <a:gd name="adj1" fmla="val 50018"/>
+              </a:avLst>
+            </a:prstGeom>
+            <a:ln w="12700" cmpd="sng">
+              <a:solidFill>
+                <a:schemeClr val="accent1">
+                  <a:shade val="50000"/>
+                </a:schemeClr>
+              </a:solidFill>
+              <a:prstDash val="sysDot"/>
+              <a:tailEnd type="arrow"/>
+            </a:ln>
+          </p:spPr>
+          <p:style>
+            <a:lnRef idx="1">
+              <a:schemeClr val="accent1"/>
+            </a:lnRef>
+            <a:fillRef idx="0">
+              <a:schemeClr val="accent1"/>
+            </a:fillRef>
+            <a:effectRef idx="0">
+              <a:schemeClr val="accent1"/>
+            </a:effectRef>
+            <a:fontRef idx="minor">
+              <a:schemeClr val="tx1"/>
+            </a:fontRef>
+          </p:style>
+        </p:cxnSp>
+        <p:cxnSp>
+          <p:nvCxnSpPr>
+            <p:cNvPr id="14" name="直接箭头连接符 12"/>
+            <p:cNvCxnSpPr>
+              <a:stCxn id="42" idx="3"/>
+              <a:endCxn id="49" idx="1"/>
+            </p:cNvCxnSpPr>
+            <p:nvPr/>
+          </p:nvCxnSpPr>
+          <p:spPr>
+            <a:xfrm>
+              <a:off x="14629" y="6473"/>
+              <a:ext cx="2717" cy="5"/>
+            </a:xfrm>
+            <a:prstGeom prst="bentConnector2">
+              <a:avLst/>
+            </a:prstGeom>
+            <a:ln w="12700" cmpd="sng">
+              <a:solidFill>
+                <a:schemeClr val="accent1">
+                  <a:shade val="50000"/>
+                </a:schemeClr>
+              </a:solidFill>
+              <a:prstDash val="sysDot"/>
+              <a:tailEnd type="arrow"/>
+            </a:ln>
+          </p:spPr>
+          <p:style>
+            <a:lnRef idx="1">
+              <a:schemeClr val="accent1"/>
+            </a:lnRef>
+            <a:fillRef idx="0">
+              <a:schemeClr val="accent1"/>
+            </a:fillRef>
+            <a:effectRef idx="0">
+              <a:schemeClr val="accent1"/>
+            </a:effectRef>
+            <a:fontRef idx="minor">
+              <a:schemeClr val="tx1"/>
+            </a:fontRef>
+          </p:style>
+        </p:cxnSp>
+        <p:sp>
+          <p:nvSpPr>
+            <p:cNvPr id="54" name="TextBox 21"/>
+            <p:cNvSpPr txBox="1"/>
+            <p:nvPr/>
+          </p:nvSpPr>
+          <p:spPr>
+            <a:xfrm>
+              <a:off x="14584" y="5702"/>
+              <a:ext cx="2878" cy="623"/>
+            </a:xfrm>
+            <a:prstGeom prst="rect">
+              <a:avLst/>
+            </a:prstGeom>
+            <a:noFill/>
+          </p:spPr>
+          <p:txBody>
+            <a:bodyPr wrap="none" rtlCol="0">
+              <a:spAutoFit/>
+            </a:bodyPr>
+            <a:p>
+              <a:pPr algn="l"/>
+              <a:r>
+                <a:rPr lang="zh-CN" altLang="en-US" sz="1800" dirty="0" smtClean="0">
+                  <a:solidFill>
+                    <a:schemeClr val="bg1"/>
+                  </a:solidFill>
+                </a:rPr>
+                <a:t>node changes</a:t>
+              </a:r>
+              <a:endParaRPr lang="zh-CN" altLang="en-US" sz="1800" dirty="0" smtClean="0">
+                <a:solidFill>
+                  <a:schemeClr val="bg1"/>
+                </a:solidFill>
+              </a:endParaRPr>
+            </a:p>
+          </p:txBody>
+        </p:sp>
+      </p:grpSp>
+    </p:spTree>
+  </p:cSld>
+  <p:clrMapOvr>
+    <a:masterClrMapping/>
+  </p:clrMapOvr>
+  <p:transition spd="med"/>
+  <p:timing>
+    <p:tnLst>
+      <p:par>
+        <p:cTn id="1" dur="indefinite" restart="never" nodeType="tmRoot"/>
+      </p:par>
+    </p:tnLst>
+  </p:timing>
+</p:sld>
+</file>
+
+<file path=ppt/slides/slide41.xml><?xml version="1.0" encoding="utf-8"?>
 <p:sld xmlns:a="http://schemas.openxmlformats.org/drawingml/2006/main" xmlns:r="http://schemas.openxmlformats.org/officeDocument/2006/relationships" xmlns:p="http://schemas.openxmlformats.org/presentationml/2006/main">
   <p:cSld>
     <p:spTree>
@@ -40503,368 +40808,6 @@
           <a:lstStyle/>
           <a:p>
             <a:endParaRPr lang="zh-CN" altLang="en-US" sz="4200"/>
-          </a:p>
-        </p:txBody>
-      </p:sp>
-    </p:spTree>
-  </p:cSld>
-  <p:clrMapOvr>
-    <a:masterClrMapping/>
-  </p:clrMapOvr>
-  <p:transition spd="med"/>
-  <p:timing>
-    <p:tnLst>
-      <p:par>
-        <p:cTn id="1" dur="indefinite" restart="never" nodeType="tmRoot"/>
-      </p:par>
-    </p:tnLst>
-  </p:timing>
-</p:sld>
-</file>
-
-<file path=ppt/slides/slide41.xml><?xml version="1.0" encoding="utf-8"?>
-<p:sld xmlns:a="http://schemas.openxmlformats.org/drawingml/2006/main" xmlns:r="http://schemas.openxmlformats.org/officeDocument/2006/relationships" xmlns:p="http://schemas.openxmlformats.org/presentationml/2006/main">
-  <p:cSld>
-    <p:spTree>
-      <p:nvGrpSpPr>
-        <p:cNvPr id="1" name=""/>
-        <p:cNvGrpSpPr/>
-        <p:nvPr/>
-      </p:nvGrpSpPr>
-      <p:grpSpPr>
-        <a:xfrm>
-          <a:off x="0" y="0"/>
-          <a:ext cx="0" cy="0"/>
-          <a:chOff x="0" y="0"/>
-          <a:chExt cx="0" cy="0"/>
-        </a:xfrm>
-      </p:grpSpPr>
-      <p:grpSp>
-        <p:nvGrpSpPr>
-          <p:cNvPr id="6" name="Group 5"/>
-          <p:cNvGrpSpPr/>
-          <p:nvPr/>
-        </p:nvGrpSpPr>
-        <p:grpSpPr>
-          <a:xfrm>
-            <a:off x="53340" y="372745"/>
-            <a:ext cx="19359880" cy="877570"/>
-            <a:chOff x="247" y="444"/>
-            <a:chExt cx="30913" cy="1382"/>
-          </a:xfrm>
-        </p:grpSpPr>
-        <p:cxnSp>
-          <p:nvCxnSpPr>
-            <p:cNvPr id="11" name="直接连接符 28"/>
-            <p:cNvCxnSpPr/>
-            <p:nvPr/>
-          </p:nvCxnSpPr>
-          <p:spPr>
-            <a:xfrm flipV="1">
-              <a:off x="826" y="1794"/>
-              <a:ext cx="30334" cy="32"/>
-            </a:xfrm>
-            <a:prstGeom prst="line">
-              <a:avLst/>
-            </a:prstGeom>
-            <a:ln>
-              <a:solidFill>
-                <a:srgbClr val="5C7595"/>
-              </a:solidFill>
-            </a:ln>
-          </p:spPr>
-          <p:style>
-            <a:lnRef idx="3">
-              <a:schemeClr val="accent3"/>
-            </a:lnRef>
-            <a:fillRef idx="0">
-              <a:schemeClr val="accent3"/>
-            </a:fillRef>
-            <a:effectRef idx="2">
-              <a:schemeClr val="accent3"/>
-            </a:effectRef>
-            <a:fontRef idx="minor">
-              <a:schemeClr val="tx1"/>
-            </a:fontRef>
-          </p:style>
-        </p:cxnSp>
-        <p:sp>
-          <p:nvSpPr>
-            <p:cNvPr id="18" name="TextBox 1"/>
-            <p:cNvSpPr txBox="1"/>
-            <p:nvPr/>
-          </p:nvSpPr>
-          <p:spPr>
-            <a:xfrm>
-              <a:off x="1016" y="566"/>
-              <a:ext cx="27784" cy="1137"/>
-            </a:xfrm>
-            <a:prstGeom prst="rect">
-              <a:avLst/>
-            </a:prstGeom>
-            <a:noFill/>
-          </p:spPr>
-          <p:txBody>
-            <a:bodyPr wrap="square" lIns="0" tIns="0" rIns="0" bIns="45715" rtlCol="0">
-              <a:spAutoFit/>
-            </a:bodyPr>
-            <a:p>
-              <a:pPr>
-                <a:defRPr/>
-              </a:pPr>
-              <a:r>
-                <a:rPr sz="4000" b="1" dirty="0" smtClean="0">
-                  <a:solidFill>
-                    <a:schemeClr val="bg1"/>
-                  </a:solidFill>
-                  <a:sym typeface="+mn-ea"/>
-                </a:rPr>
-                <a:t>Best Practice 1: Use Streaming Programming Patterns</a:t>
-              </a:r>
-              <a:endParaRPr sz="4000" b="1" dirty="0" smtClean="0">
-                <a:solidFill>
-                  <a:schemeClr val="bg1"/>
-                </a:solidFill>
-                <a:sym typeface="+mn-ea"/>
-              </a:endParaRPr>
-            </a:p>
-          </p:txBody>
-        </p:sp>
-        <p:sp>
-          <p:nvSpPr>
-            <p:cNvPr id="22" name="Flowchart: Process 21"/>
-            <p:cNvSpPr/>
-            <p:nvPr/>
-          </p:nvSpPr>
-          <p:spPr>
-            <a:xfrm>
-              <a:off x="247" y="444"/>
-              <a:ext cx="579" cy="1382"/>
-            </a:xfrm>
-            <a:prstGeom prst="flowChartProcess">
-              <a:avLst/>
-            </a:prstGeom>
-            <a:solidFill>
-              <a:srgbClr val="5C7595"/>
-            </a:solidFill>
-            <a:ln>
-              <a:solidFill>
-                <a:srgbClr val="5C7595"/>
-              </a:solidFill>
-            </a:ln>
-          </p:spPr>
-          <p:style>
-            <a:lnRef idx="1">
-              <a:schemeClr val="dk1"/>
-            </a:lnRef>
-            <a:fillRef idx="2">
-              <a:schemeClr val="dk1"/>
-            </a:fillRef>
-            <a:effectRef idx="1">
-              <a:schemeClr val="dk1"/>
-            </a:effectRef>
-            <a:fontRef idx="minor">
-              <a:schemeClr val="dk1"/>
-            </a:fontRef>
-          </p:style>
-          <p:txBody>
-            <a:bodyPr rot="0" vertOverflow="overflow" horzOverflow="overflow" vert="horz" wrap="square" lIns="50800" tIns="50800" rIns="50800" bIns="50800" numCol="1" spcCol="38100" rtlCol="0" anchor="ctr" forceAA="0">
-              <a:spAutoFit/>
-            </a:bodyPr>
-            <a:p>
-              <a:pPr marL="0" marR="0" indent="0" algn="l" defTabSz="662940" rtl="0" fontAlgn="auto" latinLnBrk="0" hangingPunct="0">
-                <a:lnSpc>
-                  <a:spcPct val="110000"/>
-                </a:lnSpc>
-                <a:spcBef>
-                  <a:spcPts val="0"/>
-                </a:spcBef>
-                <a:spcAft>
-                  <a:spcPts val="0"/>
-                </a:spcAft>
-                <a:buClrTx/>
-                <a:buSzTx/>
-                <a:buFontTx/>
-                <a:buNone/>
-              </a:pPr>
-              <a:endParaRPr kumimoji="0" lang="en-US" sz="2000" b="0" i="0" u="none" strike="noStrike" cap="none" spc="60" normalizeH="0" baseline="0">
-                <a:ln>
-                  <a:noFill/>
-                </a:ln>
-                <a:solidFill>
-                  <a:srgbClr val="FF0000"/>
-                </a:solidFill>
-                <a:effectLst/>
-                <a:uFillTx/>
-                <a:latin typeface="微软雅黑" panose="020B0503020204020204" charset="-122"/>
-                <a:ea typeface="微软雅黑" panose="020B0503020204020204" charset="-122"/>
-                <a:cs typeface="微软雅黑" panose="020B0503020204020204" charset="-122"/>
-                <a:sym typeface="微软雅黑" panose="020B0503020204020204" charset="-122"/>
-              </a:endParaRPr>
-            </a:p>
-          </p:txBody>
-        </p:sp>
-      </p:grpSp>
-      <p:pic>
-        <p:nvPicPr>
-          <p:cNvPr id="1026" name="Picture 2"/>
-          <p:cNvPicPr>
-            <a:picLocks noChangeAspect="1" noChangeArrowheads="1"/>
-          </p:cNvPicPr>
-          <p:nvPr/>
-        </p:nvPicPr>
-        <p:blipFill>
-          <a:blip r:embed="rId1" cstate="print">
-            <a:extLst>
-              <a:ext uri="{28A0092B-C50C-407E-A947-70E740481C1C}">
-                <a14:useLocalDpi xmlns:a14="http://schemas.microsoft.com/office/drawing/2010/main" val="0"/>
-              </a:ext>
-            </a:extLst>
-          </a:blip>
-          <a:srcRect/>
-          <a:stretch>
-            <a:fillRect/>
-          </a:stretch>
-        </p:blipFill>
-        <p:spPr bwMode="auto">
-          <a:xfrm>
-            <a:off x="8145363" y="1529289"/>
-            <a:ext cx="2179247" cy="2334058"/>
-          </a:xfrm>
-          <a:prstGeom prst="rect">
-            <a:avLst/>
-          </a:prstGeom>
-          <a:noFill/>
-          <a:ln>
-            <a:noFill/>
-          </a:ln>
-          <a:extLst>
-            <a:ext uri="{909E8E84-426E-40DD-AFC4-6F175D3DCCD1}">
-              <a14:hiddenFill xmlns:a14="http://schemas.microsoft.com/office/drawing/2010/main">
-                <a:solidFill>
-                  <a:schemeClr val="accent1"/>
-                </a:solidFill>
-              </a14:hiddenFill>
-            </a:ext>
-            <a:ext uri="{91240B29-F687-4F45-9708-019B960494DF}">
-              <a14:hiddenLine xmlns:a14="http://schemas.microsoft.com/office/drawing/2010/main" w="9525">
-                <a:solidFill>
-                  <a:schemeClr val="tx1"/>
-                </a:solidFill>
-                <a:miter lim="800000"/>
-                <a:headEnd/>
-                <a:tailEnd/>
-              </a14:hiddenLine>
-            </a:ext>
-          </a:extLst>
-        </p:spPr>
-      </p:pic>
-      <p:sp>
-        <p:nvSpPr>
-          <p:cNvPr id="4" name="TextBox 1"/>
-          <p:cNvSpPr txBox="1"/>
-          <p:nvPr/>
-        </p:nvSpPr>
-        <p:spPr>
-          <a:xfrm>
-            <a:off x="415925" y="4186555"/>
-            <a:ext cx="18996660" cy="4829810"/>
-          </a:xfrm>
-          <a:prstGeom prst="rect">
-            <a:avLst/>
-          </a:prstGeom>
-          <a:noFill/>
-          <a:ln w="3175">
-            <a:solidFill>
-              <a:srgbClr val="5C7595"/>
-            </a:solidFill>
-          </a:ln>
-        </p:spPr>
-        <p:txBody>
-          <a:bodyPr wrap="square" rtlCol="0">
-            <a:spAutoFit/>
-          </a:bodyPr>
-          <a:p>
-            <a:r>
-              <a:rPr lang="en-US" altLang="zh-CN" sz="2800" dirty="0" smtClean="0">
-                <a:solidFill>
-                  <a:schemeClr val="bg1"/>
-                </a:solidFill>
-              </a:rPr>
-              <a:t>CuratorFrameworkFactory.Builder builder = CuratorFrameworkFactory.builder().connectString("localhost:2181").</a:t>
-            </a:r>
-            <a:endParaRPr lang="en-US" altLang="zh-CN" sz="2800" dirty="0" smtClean="0">
-              <a:solidFill>
-                <a:schemeClr val="bg1"/>
-              </a:solidFill>
-            </a:endParaRPr>
-          </a:p>
-          <a:p>
-            <a:r>
-              <a:rPr lang="en-US" altLang="zh-CN" sz="2800" dirty="0" smtClean="0">
-                <a:solidFill>
-                  <a:schemeClr val="bg1"/>
-                </a:solidFill>
-              </a:rPr>
-              <a:t>                sessionTimeoutMs(30000).connectionTimeoutMs(5000).retryPolicy(new ExponentialBackoffRetry(5000, 3, 10000)).</a:t>
-            </a:r>
-            <a:endParaRPr lang="en-US" altLang="zh-CN" sz="2800" dirty="0" smtClean="0">
-              <a:solidFill>
-                <a:schemeClr val="bg1"/>
-              </a:solidFill>
-            </a:endParaRPr>
-          </a:p>
-          <a:p>
-            <a:r>
-              <a:rPr lang="en-US" altLang="zh-CN" sz="2800" dirty="0" smtClean="0">
-                <a:solidFill>
-                  <a:schemeClr val="bg1"/>
-                </a:solidFill>
-              </a:rPr>
-              <a:t>                namespace("a.b.c");</a:t>
-            </a:r>
-            <a:endParaRPr lang="en-US" altLang="zh-CN" sz="2800" dirty="0" smtClean="0">
-              <a:solidFill>
-                <a:schemeClr val="bg1"/>
-              </a:solidFill>
-            </a:endParaRPr>
-          </a:p>
-          <a:p>
-            <a:r>
-              <a:rPr lang="en-US" altLang="zh-CN" sz="2800" dirty="0" smtClean="0">
-                <a:solidFill>
-                  <a:schemeClr val="bg1"/>
-                </a:solidFill>
-              </a:rPr>
-              <a:t>        CuratorFramework curatorFramework = builder.build();</a:t>
-            </a:r>
-            <a:endParaRPr lang="en-US" altLang="zh-CN" sz="2800" dirty="0" smtClean="0">
-              <a:solidFill>
-                <a:schemeClr val="bg1"/>
-              </a:solidFill>
-            </a:endParaRPr>
-          </a:p>
-          <a:p>
-            <a:endParaRPr lang="en-US" altLang="zh-CN" sz="2800" dirty="0" smtClean="0">
-              <a:solidFill>
-                <a:schemeClr val="bg1"/>
-              </a:solidFill>
-            </a:endParaRPr>
-          </a:p>
-          <a:p>
-            <a:r>
-              <a:rPr lang="en-US" altLang="zh-CN" sz="2800" dirty="0" smtClean="0">
-                <a:solidFill>
-                  <a:schemeClr val="bg1"/>
-                </a:solidFill>
-              </a:rPr>
-              <a:t>   curatorFramework.create().creatingParentContainersIfNeeded().withMode(CreateMode.EPHEMERAL).forPath("/a/b/c");</a:t>
-            </a:r>
-            <a:endParaRPr lang="en-US" altLang="zh-CN" sz="2800" dirty="0" smtClean="0">
-              <a:solidFill>
-                <a:schemeClr val="bg1"/>
-              </a:solidFill>
-            </a:endParaRPr>
           </a:p>
         </p:txBody>
       </p:sp>
@@ -40975,15 +40918,15 @@
                 <a:defRPr/>
               </a:pPr>
               <a:r>
-                <a:rPr sz="4000" b="1" dirty="0">
+                <a:rPr sz="4000" b="1" dirty="0" smtClean="0">
                   <a:solidFill>
                     <a:schemeClr val="bg1"/>
                   </a:solidFill>
                   <a:sym typeface="+mn-ea"/>
                 </a:rPr>
-                <a:t>Best Practice 2: Save and reuse the CuratorFrameImpl client</a:t>
+                <a:t>Best Practice 1: Use Streaming Programming Patterns</a:t>
               </a:r>
-              <a:endParaRPr sz="4000" b="1" dirty="0">
+              <a:endParaRPr sz="4000" b="1" dirty="0" smtClean="0">
                 <a:solidFill>
                   <a:schemeClr val="bg1"/>
                 </a:solidFill>
@@ -41129,8 +41072,8 @@
         </p:nvSpPr>
         <p:spPr>
           <a:xfrm>
-            <a:off x="415290" y="4186555"/>
-            <a:ext cx="18998565" cy="4153535"/>
+            <a:off x="415925" y="4186555"/>
+            <a:ext cx="18996660" cy="4829810"/>
           </a:xfrm>
           <a:prstGeom prst="rect">
             <a:avLst/>
@@ -41148,44 +41091,84 @@
           </a:bodyPr>
           <a:p>
             <a:r>
-              <a:rPr sz="4800" dirty="0" smtClean="0">
+              <a:rPr lang="en-US" altLang="zh-CN" sz="2800" dirty="0" smtClean="0">
                 <a:solidFill>
                   <a:schemeClr val="bg1"/>
                 </a:solidFill>
-                <a:sym typeface="+mn-ea"/>
               </a:rPr>
-              <a:t>CuratorFrameImpl is a wrapper around the zookeeper client, which is expensive to create and destroy.</a:t>
+              <a:t>CuratorFrameworkFactory.Builder builder = CuratorFrameworkFactory.builder().connectString("localhost:2181").</a:t>
             </a:r>
-            <a:endParaRPr sz="4800" dirty="0" smtClean="0">
+            <a:endParaRPr lang="en-US" altLang="zh-CN" sz="2800" dirty="0" smtClean="0">
               <a:solidFill>
                 <a:schemeClr val="bg1"/>
               </a:solidFill>
-              <a:sym typeface="+mn-ea"/>
             </a:endParaRPr>
           </a:p>
           <a:p>
-            <a:endParaRPr sz="4800" dirty="0" smtClean="0">
+            <a:r>
+              <a:rPr lang="en-US" altLang="zh-CN" sz="2800" dirty="0" smtClean="0">
+                <a:solidFill>
+                  <a:schemeClr val="bg1"/>
+                </a:solidFill>
+              </a:rPr>
+              <a:t>                sessionTimeoutMs(30000).connectionTimeoutMs(5000).retryPolicy(new ExponentialBackoffRetry(5000, 3, 10000)).</a:t>
+            </a:r>
+            <a:endParaRPr lang="en-US" altLang="zh-CN" sz="2800" dirty="0" smtClean="0">
               <a:solidFill>
                 <a:schemeClr val="bg1"/>
               </a:solidFill>
-              <a:sym typeface="+mn-ea"/>
             </a:endParaRPr>
           </a:p>
           <a:p>
             <a:r>
-              <a:rPr sz="4800" dirty="0" smtClean="0">
+              <a:rPr lang="en-US" altLang="zh-CN" sz="2800" dirty="0" smtClean="0">
                 <a:solidFill>
                   <a:schemeClr val="bg1"/>
                 </a:solidFill>
-                <a:sym typeface="+mn-ea"/>
               </a:rPr>
-              <a:t>After it is created, it can be reused, or even share an instance globally.</a:t>
+              <a:t>                namespace("a.b.c");</a:t>
             </a:r>
-            <a:endParaRPr sz="4800" dirty="0" smtClean="0">
+            <a:endParaRPr lang="en-US" altLang="zh-CN" sz="2800" dirty="0" smtClean="0">
               <a:solidFill>
                 <a:schemeClr val="bg1"/>
               </a:solidFill>
-              <a:sym typeface="+mn-ea"/>
+            </a:endParaRPr>
+          </a:p>
+          <a:p>
+            <a:r>
+              <a:rPr lang="en-US" altLang="zh-CN" sz="2800" dirty="0" smtClean="0">
+                <a:solidFill>
+                  <a:schemeClr val="bg1"/>
+                </a:solidFill>
+              </a:rPr>
+              <a:t>        CuratorFramework curatorFramework = builder.build();</a:t>
+            </a:r>
+            <a:endParaRPr lang="en-US" altLang="zh-CN" sz="2800" dirty="0" smtClean="0">
+              <a:solidFill>
+                <a:schemeClr val="bg1"/>
+              </a:solidFill>
+            </a:endParaRPr>
+          </a:p>
+          <a:p>
+            <a:endParaRPr lang="en-US" altLang="zh-CN" sz="2800" dirty="0" smtClean="0">
+              <a:solidFill>
+                <a:schemeClr val="bg1"/>
+              </a:solidFill>
+            </a:endParaRPr>
+          </a:p>
+          <a:p>
+            <a:r>
+              <a:rPr lang="en-US" altLang="zh-CN" sz="2800" dirty="0" smtClean="0">
+                <a:solidFill>
+                  <a:schemeClr val="bg1"/>
+                </a:solidFill>
+              </a:rPr>
+              <a:t>   curatorFramework.create().creatingParentContainersIfNeeded().withMode(CreateMode.EPHEMERAL).forPath("/a/b/c");</a:t>
+            </a:r>
+            <a:endParaRPr lang="en-US" altLang="zh-CN" sz="2800" dirty="0" smtClean="0">
+              <a:solidFill>
+                <a:schemeClr val="bg1"/>
+              </a:solidFill>
             </a:endParaRPr>
           </a:p>
         </p:txBody>
@@ -41207,6 +41190,328 @@
 </file>
 
 <file path=ppt/slides/slide43.xml><?xml version="1.0" encoding="utf-8"?>
+<p:sld xmlns:a="http://schemas.openxmlformats.org/drawingml/2006/main" xmlns:r="http://schemas.openxmlformats.org/officeDocument/2006/relationships" xmlns:p="http://schemas.openxmlformats.org/presentationml/2006/main">
+  <p:cSld>
+    <p:spTree>
+      <p:nvGrpSpPr>
+        <p:cNvPr id="1" name=""/>
+        <p:cNvGrpSpPr/>
+        <p:nvPr/>
+      </p:nvGrpSpPr>
+      <p:grpSpPr>
+        <a:xfrm>
+          <a:off x="0" y="0"/>
+          <a:ext cx="0" cy="0"/>
+          <a:chOff x="0" y="0"/>
+          <a:chExt cx="0" cy="0"/>
+        </a:xfrm>
+      </p:grpSpPr>
+      <p:grpSp>
+        <p:nvGrpSpPr>
+          <p:cNvPr id="6" name="Group 5"/>
+          <p:cNvGrpSpPr/>
+          <p:nvPr/>
+        </p:nvGrpSpPr>
+        <p:grpSpPr>
+          <a:xfrm>
+            <a:off x="53340" y="372745"/>
+            <a:ext cx="19359880" cy="877570"/>
+            <a:chOff x="247" y="444"/>
+            <a:chExt cx="30913" cy="1382"/>
+          </a:xfrm>
+        </p:grpSpPr>
+        <p:cxnSp>
+          <p:nvCxnSpPr>
+            <p:cNvPr id="11" name="直接连接符 28"/>
+            <p:cNvCxnSpPr/>
+            <p:nvPr/>
+          </p:nvCxnSpPr>
+          <p:spPr>
+            <a:xfrm flipV="1">
+              <a:off x="826" y="1794"/>
+              <a:ext cx="30334" cy="32"/>
+            </a:xfrm>
+            <a:prstGeom prst="line">
+              <a:avLst/>
+            </a:prstGeom>
+            <a:ln>
+              <a:solidFill>
+                <a:srgbClr val="5C7595"/>
+              </a:solidFill>
+            </a:ln>
+          </p:spPr>
+          <p:style>
+            <a:lnRef idx="3">
+              <a:schemeClr val="accent3"/>
+            </a:lnRef>
+            <a:fillRef idx="0">
+              <a:schemeClr val="accent3"/>
+            </a:fillRef>
+            <a:effectRef idx="2">
+              <a:schemeClr val="accent3"/>
+            </a:effectRef>
+            <a:fontRef idx="minor">
+              <a:schemeClr val="tx1"/>
+            </a:fontRef>
+          </p:style>
+        </p:cxnSp>
+        <p:sp>
+          <p:nvSpPr>
+            <p:cNvPr id="18" name="TextBox 1"/>
+            <p:cNvSpPr txBox="1"/>
+            <p:nvPr/>
+          </p:nvSpPr>
+          <p:spPr>
+            <a:xfrm>
+              <a:off x="1016" y="566"/>
+              <a:ext cx="27784" cy="1137"/>
+            </a:xfrm>
+            <a:prstGeom prst="rect">
+              <a:avLst/>
+            </a:prstGeom>
+            <a:noFill/>
+          </p:spPr>
+          <p:txBody>
+            <a:bodyPr wrap="square" lIns="0" tIns="0" rIns="0" bIns="45715" rtlCol="0">
+              <a:spAutoFit/>
+            </a:bodyPr>
+            <a:p>
+              <a:pPr>
+                <a:defRPr/>
+              </a:pPr>
+              <a:r>
+                <a:rPr sz="4000" b="1" dirty="0">
+                  <a:solidFill>
+                    <a:schemeClr val="bg1"/>
+                  </a:solidFill>
+                  <a:sym typeface="+mn-ea"/>
+                </a:rPr>
+                <a:t>Best Practice 2: Save and reuse the CuratorFrameImpl client</a:t>
+              </a:r>
+              <a:endParaRPr sz="4000" b="1" dirty="0">
+                <a:solidFill>
+                  <a:schemeClr val="bg1"/>
+                </a:solidFill>
+                <a:sym typeface="+mn-ea"/>
+              </a:endParaRPr>
+            </a:p>
+          </p:txBody>
+        </p:sp>
+        <p:sp>
+          <p:nvSpPr>
+            <p:cNvPr id="22" name="Flowchart: Process 21"/>
+            <p:cNvSpPr/>
+            <p:nvPr/>
+          </p:nvSpPr>
+          <p:spPr>
+            <a:xfrm>
+              <a:off x="247" y="444"/>
+              <a:ext cx="579" cy="1382"/>
+            </a:xfrm>
+            <a:prstGeom prst="flowChartProcess">
+              <a:avLst/>
+            </a:prstGeom>
+            <a:solidFill>
+              <a:srgbClr val="5C7595"/>
+            </a:solidFill>
+            <a:ln>
+              <a:solidFill>
+                <a:srgbClr val="5C7595"/>
+              </a:solidFill>
+            </a:ln>
+          </p:spPr>
+          <p:style>
+            <a:lnRef idx="1">
+              <a:schemeClr val="dk1"/>
+            </a:lnRef>
+            <a:fillRef idx="2">
+              <a:schemeClr val="dk1"/>
+            </a:fillRef>
+            <a:effectRef idx="1">
+              <a:schemeClr val="dk1"/>
+            </a:effectRef>
+            <a:fontRef idx="minor">
+              <a:schemeClr val="dk1"/>
+            </a:fontRef>
+          </p:style>
+          <p:txBody>
+            <a:bodyPr rot="0" vertOverflow="overflow" horzOverflow="overflow" vert="horz" wrap="square" lIns="50800" tIns="50800" rIns="50800" bIns="50800" numCol="1" spcCol="38100" rtlCol="0" anchor="ctr" forceAA="0">
+              <a:spAutoFit/>
+            </a:bodyPr>
+            <a:p>
+              <a:pPr marL="0" marR="0" indent="0" algn="l" defTabSz="662940" rtl="0" fontAlgn="auto" latinLnBrk="0" hangingPunct="0">
+                <a:lnSpc>
+                  <a:spcPct val="110000"/>
+                </a:lnSpc>
+                <a:spcBef>
+                  <a:spcPts val="0"/>
+                </a:spcBef>
+                <a:spcAft>
+                  <a:spcPts val="0"/>
+                </a:spcAft>
+                <a:buClrTx/>
+                <a:buSzTx/>
+                <a:buFontTx/>
+                <a:buNone/>
+              </a:pPr>
+              <a:endParaRPr kumimoji="0" lang="en-US" sz="2000" b="0" i="0" u="none" strike="noStrike" cap="none" spc="60" normalizeH="0" baseline="0">
+                <a:ln>
+                  <a:noFill/>
+                </a:ln>
+                <a:solidFill>
+                  <a:srgbClr val="FF0000"/>
+                </a:solidFill>
+                <a:effectLst/>
+                <a:uFillTx/>
+                <a:latin typeface="微软雅黑" panose="020B0503020204020204" charset="-122"/>
+                <a:ea typeface="微软雅黑" panose="020B0503020204020204" charset="-122"/>
+                <a:cs typeface="微软雅黑" panose="020B0503020204020204" charset="-122"/>
+                <a:sym typeface="微软雅黑" panose="020B0503020204020204" charset="-122"/>
+              </a:endParaRPr>
+            </a:p>
+          </p:txBody>
+        </p:sp>
+      </p:grpSp>
+      <p:pic>
+        <p:nvPicPr>
+          <p:cNvPr id="1026" name="Picture 2"/>
+          <p:cNvPicPr>
+            <a:picLocks noChangeAspect="1" noChangeArrowheads="1"/>
+          </p:cNvPicPr>
+          <p:nvPr/>
+        </p:nvPicPr>
+        <p:blipFill>
+          <a:blip r:embed="rId1" cstate="print">
+            <a:extLst>
+              <a:ext uri="{28A0092B-C50C-407E-A947-70E740481C1C}">
+                <a14:useLocalDpi xmlns:a14="http://schemas.microsoft.com/office/drawing/2010/main" val="0"/>
+              </a:ext>
+            </a:extLst>
+          </a:blip>
+          <a:srcRect/>
+          <a:stretch>
+            <a:fillRect/>
+          </a:stretch>
+        </p:blipFill>
+        <p:spPr bwMode="auto">
+          <a:xfrm>
+            <a:off x="8145363" y="1529289"/>
+            <a:ext cx="2179247" cy="2334058"/>
+          </a:xfrm>
+          <a:prstGeom prst="rect">
+            <a:avLst/>
+          </a:prstGeom>
+          <a:noFill/>
+          <a:ln>
+            <a:noFill/>
+          </a:ln>
+          <a:extLst>
+            <a:ext uri="{909E8E84-426E-40DD-AFC4-6F175D3DCCD1}">
+              <a14:hiddenFill xmlns:a14="http://schemas.microsoft.com/office/drawing/2010/main">
+                <a:solidFill>
+                  <a:schemeClr val="accent1"/>
+                </a:solidFill>
+              </a14:hiddenFill>
+            </a:ext>
+            <a:ext uri="{91240B29-F687-4F45-9708-019B960494DF}">
+              <a14:hiddenLine xmlns:a14="http://schemas.microsoft.com/office/drawing/2010/main" w="9525">
+                <a:solidFill>
+                  <a:schemeClr val="tx1"/>
+                </a:solidFill>
+                <a:miter lim="800000"/>
+                <a:headEnd/>
+                <a:tailEnd/>
+              </a14:hiddenLine>
+            </a:ext>
+          </a:extLst>
+        </p:spPr>
+      </p:pic>
+      <p:sp>
+        <p:nvSpPr>
+          <p:cNvPr id="4" name="TextBox 1"/>
+          <p:cNvSpPr txBox="1"/>
+          <p:nvPr/>
+        </p:nvSpPr>
+        <p:spPr>
+          <a:xfrm>
+            <a:off x="415290" y="4186555"/>
+            <a:ext cx="18998565" cy="4153535"/>
+          </a:xfrm>
+          <a:prstGeom prst="rect">
+            <a:avLst/>
+          </a:prstGeom>
+          <a:noFill/>
+          <a:ln w="3175">
+            <a:solidFill>
+              <a:srgbClr val="5C7595"/>
+            </a:solidFill>
+          </a:ln>
+        </p:spPr>
+        <p:txBody>
+          <a:bodyPr wrap="square" rtlCol="0">
+            <a:spAutoFit/>
+          </a:bodyPr>
+          <a:p>
+            <a:r>
+              <a:rPr sz="4800" dirty="0" smtClean="0">
+                <a:solidFill>
+                  <a:schemeClr val="bg1"/>
+                </a:solidFill>
+                <a:sym typeface="+mn-ea"/>
+              </a:rPr>
+              <a:t>CuratorFrameImpl is a wrapper around the zookeeper client, which is expensive to create and destroy.</a:t>
+            </a:r>
+            <a:endParaRPr sz="4800" dirty="0" smtClean="0">
+              <a:solidFill>
+                <a:schemeClr val="bg1"/>
+              </a:solidFill>
+              <a:sym typeface="+mn-ea"/>
+            </a:endParaRPr>
+          </a:p>
+          <a:p>
+            <a:endParaRPr sz="4800" dirty="0" smtClean="0">
+              <a:solidFill>
+                <a:schemeClr val="bg1"/>
+              </a:solidFill>
+              <a:sym typeface="+mn-ea"/>
+            </a:endParaRPr>
+          </a:p>
+          <a:p>
+            <a:r>
+              <a:rPr sz="4800" dirty="0" smtClean="0">
+                <a:solidFill>
+                  <a:schemeClr val="bg1"/>
+                </a:solidFill>
+                <a:sym typeface="+mn-ea"/>
+              </a:rPr>
+              <a:t>After it is created, it can be reused, or even share an instance globally.</a:t>
+            </a:r>
+            <a:endParaRPr sz="4800" dirty="0" smtClean="0">
+              <a:solidFill>
+                <a:schemeClr val="bg1"/>
+              </a:solidFill>
+              <a:sym typeface="+mn-ea"/>
+            </a:endParaRPr>
+          </a:p>
+        </p:txBody>
+      </p:sp>
+    </p:spTree>
+  </p:cSld>
+  <p:clrMapOvr>
+    <a:masterClrMapping/>
+  </p:clrMapOvr>
+  <p:transition spd="med"/>
+  <p:timing>
+    <p:tnLst>
+      <p:par>
+        <p:cTn id="1" dur="indefinite" restart="never" nodeType="tmRoot"/>
+      </p:par>
+    </p:tnLst>
+  </p:timing>
+</p:sld>
+</file>
+
+<file path=ppt/slides/slide44.xml><?xml version="1.0" encoding="utf-8"?>
 <p:sld xmlns:a="http://schemas.openxmlformats.org/drawingml/2006/main" xmlns:r="http://schemas.openxmlformats.org/officeDocument/2006/relationships" xmlns:p="http://schemas.openxmlformats.org/presentationml/2006/main">
   <p:cSld>
     <p:spTree>
@@ -41503,7 +41808,7 @@
 </p:sld>
 </file>
 
-<file path=ppt/slides/slide44.xml><?xml version="1.0" encoding="utf-8"?>
+<file path=ppt/slides/slide45.xml><?xml version="1.0" encoding="utf-8"?>
 <p:sld xmlns:a="http://schemas.openxmlformats.org/drawingml/2006/main" xmlns:r="http://schemas.openxmlformats.org/officeDocument/2006/relationships" xmlns:p="http://schemas.openxmlformats.org/presentationml/2006/main">
   <p:cSld>
     <p:spTree>
@@ -41852,7 +42157,7 @@
 </p:sld>
 </file>
 
-<file path=ppt/slides/slide45.xml><?xml version="1.0" encoding="utf-8"?>
+<file path=ppt/slides/slide46.xml><?xml version="1.0" encoding="utf-8"?>
 <p:sld xmlns:a="http://schemas.openxmlformats.org/drawingml/2006/main" xmlns:r="http://schemas.openxmlformats.org/officeDocument/2006/relationships" xmlns:p="http://schemas.openxmlformats.org/presentationml/2006/main">
   <p:cSld>
     <p:spTree>
@@ -42191,7 +42496,7 @@
 </p:sld>
 </file>
 
-<file path=ppt/slides/slide46.xml><?xml version="1.0" encoding="utf-8"?>
+<file path=ppt/slides/slide47.xml><?xml version="1.0" encoding="utf-8"?>
 <p:sld xmlns:a="http://schemas.openxmlformats.org/drawingml/2006/main" xmlns:r="http://schemas.openxmlformats.org/officeDocument/2006/relationships" xmlns:p="http://schemas.openxmlformats.org/presentationml/2006/main">
   <p:cSld>
     <p:spTree>
@@ -42437,7 +42742,7 @@
         <p:spPr>
           <a:xfrm>
             <a:off x="415290" y="3785235"/>
-            <a:ext cx="18998565" cy="6862445"/>
+            <a:ext cx="18998565" cy="4154170"/>
           </a:xfrm>
           <a:prstGeom prst="rect">
             <a:avLst/>
@@ -42461,119 +42766,9 @@
                 </a:solidFill>
                 <a:sym typeface="+mn-ea"/>
               </a:rPr>
-              <a:t>Most of the LOST is the connection timeout between the client and the zk server, not the session timeout. Receiving a LOST event does not necessarily mean that the session has timed out.</a:t>
+              <a:t>Most of the LOST is the connection timeout between the client and the zk server, not the session timeout. The received LOST event does not necessarily mean the session timeout. Many people misuse it, including many documents on the Internet. LOST is an event sent by the Curator client. Session_Expired is an event sent by the server to the client, and the two should not be confused.</a:t>
             </a:r>
             <a:endParaRPr lang="zh-CN" altLang="en-US" sz="4000" dirty="0" smtClean="0">
-              <a:solidFill>
-                <a:schemeClr val="bg1"/>
-              </a:solidFill>
-              <a:sym typeface="+mn-ea"/>
-            </a:endParaRPr>
-          </a:p>
-          <a:p>
-            <a:endParaRPr lang="zh-CN" altLang="en-US" sz="4000" dirty="0" smtClean="0">
-              <a:solidFill>
-                <a:schemeClr val="bg1"/>
-              </a:solidFill>
-              <a:sym typeface="+mn-ea"/>
-            </a:endParaRPr>
-          </a:p>
-          <a:p>
-            <a:r>
-              <a:rPr lang="zh-CN" altLang="en-US" sz="4000" dirty="0" smtClean="0">
-                <a:solidFill>
-                  <a:schemeClr val="bg1"/>
-                </a:solidFill>
-                <a:sym typeface="+mn-ea"/>
-              </a:rPr>
-              <a:t>It is misused by many people, including many documents on the web.</a:t>
-            </a:r>
-            <a:endParaRPr lang="zh-CN" altLang="en-US" sz="4000" dirty="0" smtClean="0">
-              <a:solidFill>
-                <a:schemeClr val="bg1"/>
-              </a:solidFill>
-              <a:sym typeface="+mn-ea"/>
-            </a:endParaRPr>
-          </a:p>
-          <a:p>
-            <a:endParaRPr lang="zh-CN" altLang="en-US" sz="4000" dirty="0" smtClean="0">
-              <a:solidFill>
-                <a:schemeClr val="bg1"/>
-              </a:solidFill>
-              <a:sym typeface="+mn-ea"/>
-            </a:endParaRPr>
-          </a:p>
-          <a:p>
-            <a:r>
-              <a:rPr lang="zh-CN" altLang="en-US" sz="4000" dirty="0" smtClean="0">
-                <a:solidFill>
-                  <a:schemeClr val="bg1"/>
-                </a:solidFill>
-                <a:sym typeface="+mn-ea"/>
-              </a:rPr>
-              <a:t>LOST is the event sent by the Curator client</a:t>
-            </a:r>
-            <a:r>
-              <a:rPr lang="en-US" altLang="zh-CN" sz="4000" dirty="0" smtClean="0">
-                <a:solidFill>
-                  <a:schemeClr val="bg1"/>
-                </a:solidFill>
-                <a:sym typeface="+mn-ea"/>
-              </a:rPr>
-              <a:t>.</a:t>
-            </a:r>
-            <a:endParaRPr lang="zh-CN" altLang="en-US" sz="4000" dirty="0" smtClean="0">
-              <a:solidFill>
-                <a:schemeClr val="bg1"/>
-              </a:solidFill>
-              <a:sym typeface="+mn-ea"/>
-            </a:endParaRPr>
-          </a:p>
-          <a:p>
-            <a:r>
-              <a:rPr lang="zh-CN" altLang="en-US" sz="4000" dirty="0" smtClean="0">
-                <a:solidFill>
-                  <a:schemeClr val="bg1"/>
-                </a:solidFill>
-                <a:sym typeface="+mn-ea"/>
-              </a:rPr>
-              <a:t>Session_Expired is an event sent by the server to the client.</a:t>
-            </a:r>
-            <a:endParaRPr lang="zh-CN" altLang="en-US" sz="4000" dirty="0" smtClean="0">
-              <a:solidFill>
-                <a:schemeClr val="bg1"/>
-              </a:solidFill>
-              <a:sym typeface="+mn-ea"/>
-            </a:endParaRPr>
-          </a:p>
-          <a:p>
-            <a:endParaRPr lang="zh-CN" altLang="en-US" sz="4000" dirty="0" smtClean="0">
-              <a:solidFill>
-                <a:schemeClr val="bg1"/>
-              </a:solidFill>
-              <a:sym typeface="+mn-ea"/>
-            </a:endParaRPr>
-          </a:p>
-          <a:p>
-            <a:r>
-              <a:rPr lang="zh-CN" altLang="en-US" sz="4000" dirty="0" smtClean="0">
-                <a:solidFill>
-                  <a:schemeClr val="bg1"/>
-                </a:solidFill>
-                <a:sym typeface="+mn-ea"/>
-              </a:rPr>
-              <a:t>Do not confuse the two</a:t>
-            </a:r>
-            <a:r>
-              <a:rPr lang="en-US" altLang="zh-CN" sz="4000" dirty="0" smtClean="0">
-                <a:solidFill>
-                  <a:schemeClr val="bg1"/>
-                </a:solidFill>
-                <a:sym typeface="+mn-ea"/>
-              </a:rPr>
-              <a:t>.</a:t>
-            </a:r>
-            <a:endParaRPr lang="en-US" altLang="zh-CN" sz="4000" dirty="0" smtClean="0">
               <a:solidFill>
                 <a:schemeClr val="bg1"/>
               </a:solidFill>
@@ -42598,7 +42793,7 @@
 </p:sld>
 </file>
 
-<file path=ppt/slides/slide47.xml><?xml version="1.0" encoding="utf-8"?>
+<file path=ppt/slides/slide48.xml><?xml version="1.0" encoding="utf-8"?>
 <p:sld xmlns:a="http://schemas.openxmlformats.org/drawingml/2006/main" xmlns:r="http://schemas.openxmlformats.org/officeDocument/2006/relationships" xmlns:p="http://schemas.openxmlformats.org/presentationml/2006/main">
   <p:cSld>
     <p:spTree>
@@ -42868,32 +43063,7 @@
                 </a:solidFill>
                 <a:sym typeface="+mn-ea"/>
               </a:rPr>
-              <a:t>Watcher is a one-time consumption, and it must be registered again after consumption, which is prone to errors.</a:t>
-            </a:r>
-            <a:endParaRPr sz="4800" dirty="0" smtClean="0">
-              <a:solidFill>
-                <a:schemeClr val="bg1"/>
-              </a:solidFill>
-              <a:sym typeface="+mn-ea"/>
-            </a:endParaRPr>
-          </a:p>
-          <a:p>
-            <a:endParaRPr sz="4800" dirty="0" smtClean="0">
-              <a:solidFill>
-                <a:schemeClr val="bg1"/>
-              </a:solidFill>
-              <a:sym typeface="+mn-ea"/>
-            </a:endParaRPr>
-          </a:p>
-          <a:p>
-            <a:r>
-              <a:rPr sz="4800" dirty="0" smtClean="0">
-                <a:solidFill>
-                  <a:schemeClr val="bg1"/>
-                </a:solidFill>
-                <a:sym typeface="+mn-ea"/>
-              </a:rPr>
-              <a:t>Let curator manage listeners for us through NodeCache/TreeCache. Listeners will be registered, including disconnection and reconnection/session timeout.</a:t>
+              <a:t>Watcher is a one-time consumption, and it must be re-registered after consumption, which is prone to errors. Through NodeCache/TreeCache, let Curator manage the listener for us. Including disconnection of ReConnected/Session timeout, etc., the listener will be registered.</a:t>
             </a:r>
             <a:endParaRPr sz="4800" dirty="0" smtClean="0">
               <a:solidFill>
@@ -42920,7 +43090,7 @@
 </p:sld>
 </file>
 
-<file path=ppt/slides/slide48.xml><?xml version="1.0" encoding="utf-8"?>
+<file path=ppt/slides/slide49.xml><?xml version="1.0" encoding="utf-8"?>
 <p:sld xmlns:a="http://schemas.openxmlformats.org/drawingml/2006/main" xmlns:r="http://schemas.openxmlformats.org/officeDocument/2006/relationships" xmlns:p="http://schemas.openxmlformats.org/presentationml/2006/main">
   <p:cSld>
     <p:spTree>
@@ -43199,421 +43369,6 @@
               <a:t>Before introducing Best Practice 8, let's ask a question about a scenario.</a:t>
             </a:r>
             <a:endParaRPr sz="4200" b="1" dirty="0">
-              <a:solidFill>
-                <a:schemeClr val="bg1"/>
-              </a:solidFill>
-            </a:endParaRPr>
-          </a:p>
-        </p:txBody>
-      </p:sp>
-    </p:spTree>
-  </p:cSld>
-  <p:clrMapOvr>
-    <a:masterClrMapping/>
-  </p:clrMapOvr>
-  <p:transition spd="med"/>
-  <p:timing>
-    <p:tnLst>
-      <p:par>
-        <p:cTn id="1" dur="indefinite" restart="never" nodeType="tmRoot"/>
-      </p:par>
-    </p:tnLst>
-  </p:timing>
-</p:sld>
-</file>
-
-<file path=ppt/slides/slide49.xml><?xml version="1.0" encoding="utf-8"?>
-<p:sld xmlns:a="http://schemas.openxmlformats.org/drawingml/2006/main" xmlns:r="http://schemas.openxmlformats.org/officeDocument/2006/relationships" xmlns:p="http://schemas.openxmlformats.org/presentationml/2006/main">
-  <p:cSld>
-    <p:spTree>
-      <p:nvGrpSpPr>
-        <p:cNvPr id="1" name=""/>
-        <p:cNvGrpSpPr/>
-        <p:nvPr/>
-      </p:nvGrpSpPr>
-      <p:grpSpPr>
-        <a:xfrm>
-          <a:off x="0" y="0"/>
-          <a:ext cx="0" cy="0"/>
-          <a:chOff x="0" y="0"/>
-          <a:chExt cx="0" cy="0"/>
-        </a:xfrm>
-      </p:grpSpPr>
-      <p:grpSp>
-        <p:nvGrpSpPr>
-          <p:cNvPr id="6" name="Group 5"/>
-          <p:cNvGrpSpPr/>
-          <p:nvPr/>
-        </p:nvGrpSpPr>
-        <p:grpSpPr>
-          <a:xfrm>
-            <a:off x="53340" y="450215"/>
-            <a:ext cx="19359879" cy="800100"/>
-            <a:chOff x="247" y="566"/>
-            <a:chExt cx="30913" cy="1260"/>
-          </a:xfrm>
-        </p:grpSpPr>
-        <p:cxnSp>
-          <p:nvCxnSpPr>
-            <p:cNvPr id="11" name="直接连接符 28"/>
-            <p:cNvCxnSpPr/>
-            <p:nvPr/>
-          </p:nvCxnSpPr>
-          <p:spPr>
-            <a:xfrm flipV="1">
-              <a:off x="826" y="1794"/>
-              <a:ext cx="30334" cy="32"/>
-            </a:xfrm>
-            <a:prstGeom prst="line">
-              <a:avLst/>
-            </a:prstGeom>
-            <a:ln>
-              <a:solidFill>
-                <a:srgbClr val="5C7595"/>
-              </a:solidFill>
-            </a:ln>
-          </p:spPr>
-          <p:style>
-            <a:lnRef idx="3">
-              <a:schemeClr val="accent3"/>
-            </a:lnRef>
-            <a:fillRef idx="0">
-              <a:schemeClr val="accent3"/>
-            </a:fillRef>
-            <a:effectRef idx="2">
-              <a:schemeClr val="accent3"/>
-            </a:effectRef>
-            <a:fontRef idx="minor">
-              <a:schemeClr val="tx1"/>
-            </a:fontRef>
-          </p:style>
-        </p:cxnSp>
-        <p:sp>
-          <p:nvSpPr>
-            <p:cNvPr id="18" name="TextBox 1"/>
-            <p:cNvSpPr txBox="1"/>
-            <p:nvPr/>
-          </p:nvSpPr>
-          <p:spPr>
-            <a:xfrm>
-              <a:off x="1016" y="566"/>
-              <a:ext cx="27784" cy="1137"/>
-            </a:xfrm>
-            <a:prstGeom prst="rect">
-              <a:avLst/>
-            </a:prstGeom>
-            <a:noFill/>
-          </p:spPr>
-          <p:txBody>
-            <a:bodyPr wrap="square" lIns="0" tIns="0" rIns="0" bIns="45715" rtlCol="0">
-              <a:spAutoFit/>
-            </a:bodyPr>
-            <a:p>
-              <a:pPr>
-                <a:defRPr/>
-              </a:pPr>
-              <a:r>
-                <a:rPr sz="4000" b="1" dirty="0" smtClean="0">
-                  <a:solidFill>
-                    <a:schemeClr val="bg1"/>
-                  </a:solidFill>
-                  <a:sym typeface="+mn-ea"/>
-                </a:rPr>
-                <a:t>Best Practice 8: Use withProtection to create sequential nodes</a:t>
-              </a:r>
-              <a:endParaRPr sz="4000" b="1" dirty="0" smtClean="0">
-                <a:solidFill>
-                  <a:schemeClr val="bg1"/>
-                </a:solidFill>
-                <a:sym typeface="+mn-ea"/>
-              </a:endParaRPr>
-            </a:p>
-          </p:txBody>
-        </p:sp>
-        <p:sp>
-          <p:nvSpPr>
-            <p:cNvPr id="22" name="Flowchart: Process 21"/>
-            <p:cNvSpPr/>
-            <p:nvPr/>
-          </p:nvSpPr>
-          <p:spPr>
-            <a:xfrm>
-              <a:off x="247" y="789"/>
-              <a:ext cx="579" cy="692"/>
-            </a:xfrm>
-            <a:prstGeom prst="flowChartProcess">
-              <a:avLst/>
-            </a:prstGeom>
-            <a:solidFill>
-              <a:srgbClr val="5C7595"/>
-            </a:solidFill>
-            <a:ln>
-              <a:solidFill>
-                <a:srgbClr val="5C7595"/>
-              </a:solidFill>
-            </a:ln>
-          </p:spPr>
-          <p:style>
-            <a:lnRef idx="1">
-              <a:schemeClr val="dk1"/>
-            </a:lnRef>
-            <a:fillRef idx="2">
-              <a:schemeClr val="dk1"/>
-            </a:fillRef>
-            <a:effectRef idx="1">
-              <a:schemeClr val="dk1"/>
-            </a:effectRef>
-            <a:fontRef idx="minor">
-              <a:schemeClr val="dk1"/>
-            </a:fontRef>
-          </p:style>
-          <p:txBody>
-            <a:bodyPr rot="0" vertOverflow="overflow" horzOverflow="overflow" vert="horz" wrap="square" lIns="50800" tIns="50800" rIns="50800" bIns="50800" numCol="1" spcCol="38100" rtlCol="0" anchor="ctr" forceAA="0">
-              <a:spAutoFit/>
-            </a:bodyPr>
-            <a:p>
-              <a:pPr marL="0" marR="0" indent="0" algn="l" defTabSz="662940" rtl="0" fontAlgn="auto" latinLnBrk="0" hangingPunct="0">
-                <a:lnSpc>
-                  <a:spcPct val="110000"/>
-                </a:lnSpc>
-                <a:spcBef>
-                  <a:spcPts val="0"/>
-                </a:spcBef>
-                <a:spcAft>
-                  <a:spcPts val="0"/>
-                </a:spcAft>
-                <a:buClrTx/>
-                <a:buSzTx/>
-                <a:buFontTx/>
-                <a:buNone/>
-              </a:pPr>
-              <a:endParaRPr kumimoji="0" lang="en-US" sz="2000" b="0" i="0" u="none" strike="noStrike" cap="none" spc="60" normalizeH="0" baseline="0">
-                <a:ln>
-                  <a:noFill/>
-                </a:ln>
-                <a:solidFill>
-                  <a:srgbClr val="FF0000"/>
-                </a:solidFill>
-                <a:effectLst/>
-                <a:uFillTx/>
-                <a:latin typeface="微软雅黑" panose="020B0503020204020204" charset="-122"/>
-                <a:ea typeface="微软雅黑" panose="020B0503020204020204" charset="-122"/>
-                <a:cs typeface="微软雅黑" panose="020B0503020204020204" charset="-122"/>
-                <a:sym typeface="微软雅黑" panose="020B0503020204020204" charset="-122"/>
-              </a:endParaRPr>
-            </a:p>
-          </p:txBody>
-        </p:sp>
-      </p:grpSp>
-      <p:sp>
-        <p:nvSpPr>
-          <p:cNvPr id="4" name="TextBox 3"/>
-          <p:cNvSpPr txBox="1"/>
-          <p:nvPr/>
-        </p:nvSpPr>
-        <p:spPr>
-          <a:xfrm>
-            <a:off x="415290" y="4057015"/>
-            <a:ext cx="18997930" cy="1445260"/>
-          </a:xfrm>
-          <a:prstGeom prst="rect">
-            <a:avLst/>
-          </a:prstGeom>
-          <a:noFill/>
-          <a:ln>
-            <a:solidFill>
-              <a:srgbClr val="5C7595"/>
-            </a:solidFill>
-          </a:ln>
-        </p:spPr>
-        <p:txBody>
-          <a:bodyPr wrap="square" rtlCol="0">
-            <a:spAutoFit/>
-          </a:bodyPr>
-          <a:p>
-            <a:r>
-              <a:rPr lang="en-US" altLang="zh-CN" sz="4000" dirty="0">
-                <a:solidFill>
-                  <a:schemeClr val="bg1"/>
-                </a:solidFill>
-              </a:rPr>
-              <a:t>curatorFramework.create().creatingParentsIfNeeded().withProtection().withMode(CreateMode.EPHEMERAL_SEQUENTIAL).forPath(path);</a:t>
-            </a:r>
-            <a:endParaRPr lang="en-US" altLang="zh-CN" sz="4000" dirty="0">
-              <a:solidFill>
-                <a:schemeClr val="bg1"/>
-              </a:solidFill>
-            </a:endParaRPr>
-          </a:p>
-        </p:txBody>
-      </p:sp>
-      <p:pic>
-        <p:nvPicPr>
-          <p:cNvPr id="7" name="Picture 2"/>
-          <p:cNvPicPr>
-            <a:picLocks noChangeAspect="1" noChangeArrowheads="1"/>
-          </p:cNvPicPr>
-          <p:nvPr/>
-        </p:nvPicPr>
-        <p:blipFill>
-          <a:blip r:embed="rId1" cstate="print">
-            <a:extLst>
-              <a:ext uri="{28A0092B-C50C-407E-A947-70E740481C1C}">
-                <a14:useLocalDpi xmlns:a14="http://schemas.microsoft.com/office/drawing/2010/main" val="0"/>
-              </a:ext>
-            </a:extLst>
-          </a:blip>
-          <a:srcRect/>
-          <a:stretch>
-            <a:fillRect/>
-          </a:stretch>
-        </p:blipFill>
-        <p:spPr bwMode="auto">
-          <a:xfrm>
-            <a:off x="8145055" y="1486432"/>
-            <a:ext cx="2179247" cy="2334058"/>
-          </a:xfrm>
-          <a:prstGeom prst="rect">
-            <a:avLst/>
-          </a:prstGeom>
-          <a:noFill/>
-          <a:ln>
-            <a:noFill/>
-          </a:ln>
-          <a:extLst>
-            <a:ext uri="{909E8E84-426E-40DD-AFC4-6F175D3DCCD1}">
-              <a14:hiddenFill xmlns:a14="http://schemas.microsoft.com/office/drawing/2010/main">
-                <a:solidFill>
-                  <a:schemeClr val="accent1"/>
-                </a:solidFill>
-              </a14:hiddenFill>
-            </a:ext>
-            <a:ext uri="{91240B29-F687-4F45-9708-019B960494DF}">
-              <a14:hiddenLine xmlns:a14="http://schemas.microsoft.com/office/drawing/2010/main" w="9525">
-                <a:solidFill>
-                  <a:schemeClr val="tx1"/>
-                </a:solidFill>
-                <a:miter lim="800000"/>
-                <a:headEnd/>
-                <a:tailEnd/>
-              </a14:hiddenLine>
-            </a:ext>
-          </a:extLst>
-        </p:spPr>
-      </p:pic>
-      <p:sp>
-        <p:nvSpPr>
-          <p:cNvPr id="3" name="TextBox 1"/>
-          <p:cNvSpPr txBox="1"/>
-          <p:nvPr/>
-        </p:nvSpPr>
-        <p:spPr>
-          <a:xfrm>
-            <a:off x="9239885" y="10041255"/>
-            <a:ext cx="9546590" cy="565150"/>
-          </a:xfrm>
-          <a:prstGeom prst="rect">
-            <a:avLst/>
-          </a:prstGeom>
-          <a:noFill/>
-        </p:spPr>
-        <p:txBody>
-          <a:bodyPr wrap="square" rtlCol="0">
-            <a:spAutoFit/>
-          </a:bodyPr>
-          <a:p>
-            <a:r>
-              <a:rPr sz="2800" dirty="0" smtClean="0">
-                <a:solidFill>
-                  <a:schemeClr val="tx1"/>
-                </a:solidFill>
-              </a:rPr>
-              <a:t>Leave a question: So what if it's a delete operation?</a:t>
-            </a:r>
-            <a:endParaRPr sz="2800" dirty="0" smtClean="0">
-              <a:solidFill>
-                <a:schemeClr val="tx1"/>
-              </a:solidFill>
-            </a:endParaRPr>
-          </a:p>
-        </p:txBody>
-      </p:sp>
-      <p:pic>
-        <p:nvPicPr>
-          <p:cNvPr id="5" name="Picture 4" descr="问号"/>
-          <p:cNvPicPr>
-            <a:picLocks noChangeAspect="1"/>
-          </p:cNvPicPr>
-          <p:nvPr/>
-        </p:nvPicPr>
-        <p:blipFill>
-          <a:blip r:embed="rId2"/>
-          <a:stretch>
-            <a:fillRect/>
-          </a:stretch>
-        </p:blipFill>
-        <p:spPr>
-          <a:xfrm>
-            <a:off x="18851880" y="10041255"/>
-            <a:ext cx="561340" cy="561340"/>
-          </a:xfrm>
-          <a:prstGeom prst="rect">
-            <a:avLst/>
-          </a:prstGeom>
-        </p:spPr>
-      </p:pic>
-      <p:sp>
-        <p:nvSpPr>
-          <p:cNvPr id="2" name="TextBox 1"/>
-          <p:cNvSpPr txBox="1"/>
-          <p:nvPr/>
-        </p:nvSpPr>
-        <p:spPr>
-          <a:xfrm>
-            <a:off x="401320" y="5746750"/>
-            <a:ext cx="18996660" cy="4356100"/>
-          </a:xfrm>
-          <a:prstGeom prst="rect">
-            <a:avLst/>
-          </a:prstGeom>
-          <a:noFill/>
-        </p:spPr>
-        <p:txBody>
-          <a:bodyPr wrap="square" rtlCol="0">
-            <a:spAutoFit/>
-          </a:bodyPr>
-          <a:p>
-            <a:r>
-              <a:rPr sz="2800" dirty="0" smtClean="0">
-                <a:solidFill>
-                  <a:schemeClr val="bg1"/>
-                </a:solidFill>
-              </a:rPr>
-              <a:t>CreateBuilder provides a withProtection method to notify the Curator client to add a unique identifier before the created ordered node. If the create operation fails, the client will start to retry the operation, and one step of the retry operation is to verify whether There exists a node containing this unique identifier.</a:t>
-            </a:r>
-            <a:endParaRPr sz="2800" dirty="0" smtClean="0">
-              <a:solidFill>
-                <a:schemeClr val="bg1"/>
-              </a:solidFill>
-            </a:endParaRPr>
-          </a:p>
-          <a:p>
-            <a:endParaRPr sz="2800" dirty="0" smtClean="0">
-              <a:solidFill>
-                <a:schemeClr val="bg1"/>
-              </a:solidFill>
-            </a:endParaRPr>
-          </a:p>
-          <a:p>
-            <a:r>
-              <a:rPr sz="2800" dirty="0" smtClean="0">
-                <a:solidFill>
-                  <a:schemeClr val="bg1"/>
-                </a:solidFill>
-              </a:rPr>
-              <a:t>A method is provided in the Curator client to guarantee the execution of the application's delete operation, and the Curator client will re-execute the operation until it succeeds, or when the Curator client instance is unavailable. To use this feature, it is only necessary to use the guaranteed method defined in the DeleteBuilder interface.</a:t>
-            </a:r>
-            <a:endParaRPr sz="2800" dirty="0" smtClean="0">
               <a:solidFill>
                 <a:schemeClr val="bg1"/>
               </a:solidFill>
@@ -44003,6 +43758,460 @@
 </file>
 
 <file path=ppt/slides/slide50.xml><?xml version="1.0" encoding="utf-8"?>
+<p:sld xmlns:a="http://schemas.openxmlformats.org/drawingml/2006/main" xmlns:r="http://schemas.openxmlformats.org/officeDocument/2006/relationships" xmlns:p="http://schemas.openxmlformats.org/presentationml/2006/main" show="0">
+  <p:cSld>
+    <p:bg>
+      <p:bgPr>
+        <a:solidFill>
+          <a:schemeClr val="bg1">
+            <a:lumMod val="10000"/>
+            <a:lumOff val="90000"/>
+          </a:schemeClr>
+        </a:solidFill>
+        <a:effectLst/>
+      </p:bgPr>
+    </p:bg>
+    <p:spTree>
+      <p:nvGrpSpPr>
+        <p:cNvPr id="1" name=""/>
+        <p:cNvGrpSpPr/>
+        <p:nvPr/>
+      </p:nvGrpSpPr>
+      <p:grpSpPr>
+        <a:xfrm>
+          <a:off x="0" y="0"/>
+          <a:ext cx="0" cy="0"/>
+          <a:chOff x="0" y="0"/>
+          <a:chExt cx="0" cy="0"/>
+        </a:xfrm>
+      </p:grpSpPr>
+      <p:pic>
+        <p:nvPicPr>
+          <p:cNvPr id="2050" name="Picture 2"/>
+          <p:cNvPicPr>
+            <a:picLocks noChangeAspect="1" noChangeArrowheads="1"/>
+          </p:cNvPicPr>
+          <p:nvPr/>
+        </p:nvPicPr>
+        <p:blipFill>
+          <a:blip r:embed="rId1">
+            <a:extLst>
+              <a:ext uri="{28A0092B-C50C-407E-A947-70E740481C1C}">
+                <a14:useLocalDpi xmlns:a14="http://schemas.microsoft.com/office/drawing/2010/main" val="0"/>
+              </a:ext>
+            </a:extLst>
+          </a:blip>
+          <a:srcRect/>
+          <a:stretch>
+            <a:fillRect/>
+          </a:stretch>
+        </p:blipFill>
+        <p:spPr bwMode="auto">
+          <a:xfrm>
+            <a:off x="468630" y="627380"/>
+            <a:ext cx="18646140" cy="9541510"/>
+          </a:xfrm>
+          <a:prstGeom prst="rect">
+            <a:avLst/>
+          </a:prstGeom>
+          <a:solidFill>
+            <a:schemeClr val="accent1"/>
+          </a:solidFill>
+          <a:ln>
+            <a:noFill/>
+          </a:ln>
+          <a:extLst>
+            <a:ext uri="{909E8E84-426E-40DD-AFC4-6F175D3DCCD1}">
+              <a14:hiddenFill xmlns:a14="http://schemas.microsoft.com/office/drawing/2010/main">
+                <a:solidFill>
+                  <a:schemeClr val="accent1"/>
+                </a:solidFill>
+              </a14:hiddenFill>
+            </a:ext>
+            <a:ext uri="{91240B29-F687-4F45-9708-019B960494DF}">
+              <a14:hiddenLine xmlns:a14="http://schemas.microsoft.com/office/drawing/2010/main" w="9525">
+                <a:solidFill>
+                  <a:schemeClr val="tx1"/>
+                </a:solidFill>
+                <a:miter lim="800000"/>
+                <a:headEnd/>
+                <a:tailEnd/>
+              </a14:hiddenLine>
+            </a:ext>
+          </a:extLst>
+        </p:spPr>
+      </p:pic>
+    </p:spTree>
+  </p:cSld>
+  <p:clrMapOvr>
+    <a:masterClrMapping/>
+  </p:clrMapOvr>
+  <p:transition spd="med"/>
+  <p:timing>
+    <p:tnLst>
+      <p:par>
+        <p:cTn id="1" dur="indefinite" restart="never" nodeType="tmRoot"/>
+      </p:par>
+    </p:tnLst>
+  </p:timing>
+</p:sld>
+</file>
+
+<file path=ppt/slides/slide51.xml><?xml version="1.0" encoding="utf-8"?>
+<p:sld xmlns:a="http://schemas.openxmlformats.org/drawingml/2006/main" xmlns:r="http://schemas.openxmlformats.org/officeDocument/2006/relationships" xmlns:p="http://schemas.openxmlformats.org/presentationml/2006/main">
+  <p:cSld>
+    <p:spTree>
+      <p:nvGrpSpPr>
+        <p:cNvPr id="1" name=""/>
+        <p:cNvGrpSpPr/>
+        <p:nvPr/>
+      </p:nvGrpSpPr>
+      <p:grpSpPr>
+        <a:xfrm>
+          <a:off x="0" y="0"/>
+          <a:ext cx="0" cy="0"/>
+          <a:chOff x="0" y="0"/>
+          <a:chExt cx="0" cy="0"/>
+        </a:xfrm>
+      </p:grpSpPr>
+      <p:grpSp>
+        <p:nvGrpSpPr>
+          <p:cNvPr id="6" name="Group 5"/>
+          <p:cNvGrpSpPr/>
+          <p:nvPr/>
+        </p:nvGrpSpPr>
+        <p:grpSpPr>
+          <a:xfrm>
+            <a:off x="53340" y="450215"/>
+            <a:ext cx="19359879" cy="800100"/>
+            <a:chOff x="247" y="566"/>
+            <a:chExt cx="30913" cy="1260"/>
+          </a:xfrm>
+        </p:grpSpPr>
+        <p:cxnSp>
+          <p:nvCxnSpPr>
+            <p:cNvPr id="11" name="直接连接符 28"/>
+            <p:cNvCxnSpPr/>
+            <p:nvPr/>
+          </p:nvCxnSpPr>
+          <p:spPr>
+            <a:xfrm flipV="1">
+              <a:off x="826" y="1794"/>
+              <a:ext cx="30334" cy="32"/>
+            </a:xfrm>
+            <a:prstGeom prst="line">
+              <a:avLst/>
+            </a:prstGeom>
+            <a:ln>
+              <a:solidFill>
+                <a:srgbClr val="5C7595"/>
+              </a:solidFill>
+            </a:ln>
+          </p:spPr>
+          <p:style>
+            <a:lnRef idx="3">
+              <a:schemeClr val="accent3"/>
+            </a:lnRef>
+            <a:fillRef idx="0">
+              <a:schemeClr val="accent3"/>
+            </a:fillRef>
+            <a:effectRef idx="2">
+              <a:schemeClr val="accent3"/>
+            </a:effectRef>
+            <a:fontRef idx="minor">
+              <a:schemeClr val="tx1"/>
+            </a:fontRef>
+          </p:style>
+        </p:cxnSp>
+        <p:sp>
+          <p:nvSpPr>
+            <p:cNvPr id="18" name="TextBox 1"/>
+            <p:cNvSpPr txBox="1"/>
+            <p:nvPr/>
+          </p:nvSpPr>
+          <p:spPr>
+            <a:xfrm>
+              <a:off x="1016" y="566"/>
+              <a:ext cx="27784" cy="1137"/>
+            </a:xfrm>
+            <a:prstGeom prst="rect">
+              <a:avLst/>
+            </a:prstGeom>
+            <a:noFill/>
+          </p:spPr>
+          <p:txBody>
+            <a:bodyPr wrap="square" lIns="0" tIns="0" rIns="0" bIns="45715" rtlCol="0">
+              <a:spAutoFit/>
+            </a:bodyPr>
+            <a:p>
+              <a:pPr>
+                <a:defRPr/>
+              </a:pPr>
+              <a:r>
+                <a:rPr sz="4000" b="1" dirty="0" smtClean="0">
+                  <a:solidFill>
+                    <a:schemeClr val="bg1"/>
+                  </a:solidFill>
+                  <a:sym typeface="+mn-ea"/>
+                </a:rPr>
+                <a:t>Best Practice 8: Use withProtection to create sequential nodes</a:t>
+              </a:r>
+              <a:endParaRPr sz="4000" b="1" dirty="0" smtClean="0">
+                <a:solidFill>
+                  <a:schemeClr val="bg1"/>
+                </a:solidFill>
+                <a:sym typeface="+mn-ea"/>
+              </a:endParaRPr>
+            </a:p>
+          </p:txBody>
+        </p:sp>
+        <p:sp>
+          <p:nvSpPr>
+            <p:cNvPr id="22" name="Flowchart: Process 21"/>
+            <p:cNvSpPr/>
+            <p:nvPr/>
+          </p:nvSpPr>
+          <p:spPr>
+            <a:xfrm>
+              <a:off x="247" y="789"/>
+              <a:ext cx="579" cy="692"/>
+            </a:xfrm>
+            <a:prstGeom prst="flowChartProcess">
+              <a:avLst/>
+            </a:prstGeom>
+            <a:solidFill>
+              <a:srgbClr val="5C7595"/>
+            </a:solidFill>
+            <a:ln>
+              <a:solidFill>
+                <a:srgbClr val="5C7595"/>
+              </a:solidFill>
+            </a:ln>
+          </p:spPr>
+          <p:style>
+            <a:lnRef idx="1">
+              <a:schemeClr val="dk1"/>
+            </a:lnRef>
+            <a:fillRef idx="2">
+              <a:schemeClr val="dk1"/>
+            </a:fillRef>
+            <a:effectRef idx="1">
+              <a:schemeClr val="dk1"/>
+            </a:effectRef>
+            <a:fontRef idx="minor">
+              <a:schemeClr val="dk1"/>
+            </a:fontRef>
+          </p:style>
+          <p:txBody>
+            <a:bodyPr rot="0" vertOverflow="overflow" horzOverflow="overflow" vert="horz" wrap="square" lIns="50800" tIns="50800" rIns="50800" bIns="50800" numCol="1" spcCol="38100" rtlCol="0" anchor="ctr" forceAA="0">
+              <a:spAutoFit/>
+            </a:bodyPr>
+            <a:p>
+              <a:pPr marL="0" marR="0" indent="0" algn="l" defTabSz="662940" rtl="0" fontAlgn="auto" latinLnBrk="0" hangingPunct="0">
+                <a:lnSpc>
+                  <a:spcPct val="110000"/>
+                </a:lnSpc>
+                <a:spcBef>
+                  <a:spcPts val="0"/>
+                </a:spcBef>
+                <a:spcAft>
+                  <a:spcPts val="0"/>
+                </a:spcAft>
+                <a:buClrTx/>
+                <a:buSzTx/>
+                <a:buFontTx/>
+                <a:buNone/>
+              </a:pPr>
+              <a:endParaRPr kumimoji="0" lang="en-US" sz="2000" b="0" i="0" u="none" strike="noStrike" cap="none" spc="60" normalizeH="0" baseline="0">
+                <a:ln>
+                  <a:noFill/>
+                </a:ln>
+                <a:solidFill>
+                  <a:srgbClr val="FF0000"/>
+                </a:solidFill>
+                <a:effectLst/>
+                <a:uFillTx/>
+                <a:latin typeface="微软雅黑" panose="020B0503020204020204" charset="-122"/>
+                <a:ea typeface="微软雅黑" panose="020B0503020204020204" charset="-122"/>
+                <a:cs typeface="微软雅黑" panose="020B0503020204020204" charset="-122"/>
+                <a:sym typeface="微软雅黑" panose="020B0503020204020204" charset="-122"/>
+              </a:endParaRPr>
+            </a:p>
+          </p:txBody>
+        </p:sp>
+      </p:grpSp>
+      <p:sp>
+        <p:nvSpPr>
+          <p:cNvPr id="4" name="TextBox 3"/>
+          <p:cNvSpPr txBox="1"/>
+          <p:nvPr/>
+        </p:nvSpPr>
+        <p:spPr>
+          <a:xfrm>
+            <a:off x="415290" y="4057015"/>
+            <a:ext cx="18997930" cy="1445260"/>
+          </a:xfrm>
+          <a:prstGeom prst="rect">
+            <a:avLst/>
+          </a:prstGeom>
+          <a:noFill/>
+          <a:ln>
+            <a:solidFill>
+              <a:srgbClr val="5C7595"/>
+            </a:solidFill>
+          </a:ln>
+        </p:spPr>
+        <p:txBody>
+          <a:bodyPr wrap="square" rtlCol="0">
+            <a:spAutoFit/>
+          </a:bodyPr>
+          <a:p>
+            <a:r>
+              <a:rPr lang="en-US" altLang="zh-CN" sz="4000" dirty="0">
+                <a:solidFill>
+                  <a:schemeClr val="bg1"/>
+                </a:solidFill>
+              </a:rPr>
+              <a:t>curatorFramework.create().creatingParentsIfNeeded().withProtection().withMode(CreateMode.EPHEMERAL_SEQUENTIAL).forPath(path);</a:t>
+            </a:r>
+            <a:endParaRPr lang="en-US" altLang="zh-CN" sz="4000" dirty="0">
+              <a:solidFill>
+                <a:schemeClr val="bg1"/>
+              </a:solidFill>
+            </a:endParaRPr>
+          </a:p>
+        </p:txBody>
+      </p:sp>
+      <p:pic>
+        <p:nvPicPr>
+          <p:cNvPr id="7" name="Picture 2"/>
+          <p:cNvPicPr>
+            <a:picLocks noChangeAspect="1" noChangeArrowheads="1"/>
+          </p:cNvPicPr>
+          <p:nvPr/>
+        </p:nvPicPr>
+        <p:blipFill>
+          <a:blip r:embed="rId1" cstate="print">
+            <a:extLst>
+              <a:ext uri="{28A0092B-C50C-407E-A947-70E740481C1C}">
+                <a14:useLocalDpi xmlns:a14="http://schemas.microsoft.com/office/drawing/2010/main" val="0"/>
+              </a:ext>
+            </a:extLst>
+          </a:blip>
+          <a:srcRect/>
+          <a:stretch>
+            <a:fillRect/>
+          </a:stretch>
+        </p:blipFill>
+        <p:spPr bwMode="auto">
+          <a:xfrm>
+            <a:off x="8145055" y="1486432"/>
+            <a:ext cx="2179247" cy="2334058"/>
+          </a:xfrm>
+          <a:prstGeom prst="rect">
+            <a:avLst/>
+          </a:prstGeom>
+          <a:noFill/>
+          <a:ln>
+            <a:noFill/>
+          </a:ln>
+          <a:extLst>
+            <a:ext uri="{909E8E84-426E-40DD-AFC4-6F175D3DCCD1}">
+              <a14:hiddenFill xmlns:a14="http://schemas.microsoft.com/office/drawing/2010/main">
+                <a:solidFill>
+                  <a:schemeClr val="accent1"/>
+                </a:solidFill>
+              </a14:hiddenFill>
+            </a:ext>
+            <a:ext uri="{91240B29-F687-4F45-9708-019B960494DF}">
+              <a14:hiddenLine xmlns:a14="http://schemas.microsoft.com/office/drawing/2010/main" w="9525">
+                <a:solidFill>
+                  <a:schemeClr val="tx1"/>
+                </a:solidFill>
+                <a:miter lim="800000"/>
+                <a:headEnd/>
+                <a:tailEnd/>
+              </a14:hiddenLine>
+            </a:ext>
+          </a:extLst>
+        </p:spPr>
+      </p:pic>
+      <p:sp>
+        <p:nvSpPr>
+          <p:cNvPr id="2" name="TextBox 1"/>
+          <p:cNvSpPr txBox="1"/>
+          <p:nvPr/>
+        </p:nvSpPr>
+        <p:spPr>
+          <a:xfrm>
+            <a:off x="401320" y="5746750"/>
+            <a:ext cx="18996660" cy="4356100"/>
+          </a:xfrm>
+          <a:prstGeom prst="rect">
+            <a:avLst/>
+          </a:prstGeom>
+          <a:noFill/>
+        </p:spPr>
+        <p:txBody>
+          <a:bodyPr wrap="square" rtlCol="0">
+            <a:spAutoFit/>
+          </a:bodyPr>
+          <a:p>
+            <a:r>
+              <a:rPr sz="2800" dirty="0" smtClean="0">
+                <a:solidFill>
+                  <a:schemeClr val="bg1"/>
+                </a:solidFill>
+              </a:rPr>
+              <a:t>CreateBuilder provides a withProtection method to notify the Curator client to add a unique identifier before the created ordered node. If the create operation fails, the client will start to retry the operation, and one step of the retry operation is to verify whether There exists a node containing this unique identifier.</a:t>
+            </a:r>
+            <a:endParaRPr sz="2800" dirty="0" smtClean="0">
+              <a:solidFill>
+                <a:schemeClr val="bg1"/>
+              </a:solidFill>
+            </a:endParaRPr>
+          </a:p>
+          <a:p>
+            <a:endParaRPr sz="2800" dirty="0" smtClean="0">
+              <a:solidFill>
+                <a:schemeClr val="bg1"/>
+              </a:solidFill>
+            </a:endParaRPr>
+          </a:p>
+          <a:p>
+            <a:r>
+              <a:rPr sz="2800" dirty="0" smtClean="0">
+                <a:solidFill>
+                  <a:schemeClr val="bg1"/>
+                </a:solidFill>
+              </a:rPr>
+              <a:t>A method is provided in the Curator client to guarantee the execution of the application's delete operation, and the Curator client will re-execute the operation until it succeeds, or when the Curator client instance is unavailable. To use this feature, it is only necessary to use the guaranteed method defined in the DeleteBuilder interface.</a:t>
+            </a:r>
+            <a:endParaRPr sz="2800" dirty="0" smtClean="0">
+              <a:solidFill>
+                <a:schemeClr val="bg1"/>
+              </a:solidFill>
+            </a:endParaRPr>
+          </a:p>
+        </p:txBody>
+      </p:sp>
+    </p:spTree>
+  </p:cSld>
+  <p:clrMapOvr>
+    <a:masterClrMapping/>
+  </p:clrMapOvr>
+  <p:transition spd="med"/>
+  <p:timing>
+    <p:tnLst>
+      <p:par>
+        <p:cTn id="1" dur="indefinite" restart="never" nodeType="tmRoot"/>
+      </p:par>
+    </p:tnLst>
+  </p:timing>
+</p:sld>
+</file>
+
+<file path=ppt/slides/slide52.xml><?xml version="1.0" encoding="utf-8"?>
 <p:sld xmlns:a="http://schemas.openxmlformats.org/drawingml/2006/main" xmlns:r="http://schemas.openxmlformats.org/officeDocument/2006/relationships" xmlns:p="http://schemas.openxmlformats.org/presentationml/2006/main">
   <p:cSld>
     <p:spTree>

</xml_diff>